<commit_message>
Lesson 5. Added pdfs.
</commit_message>
<xml_diff>
--- a/Lesson 4/Lesson 4.pptx
+++ b/Lesson 4/Lesson 4.pptx
@@ -14,22 +14,23 @@
     <p:sldId id="318" r:id="rId8"/>
     <p:sldId id="305" r:id="rId9"/>
     <p:sldId id="307" r:id="rId10"/>
-    <p:sldId id="319" r:id="rId11"/>
-    <p:sldId id="268" r:id="rId12"/>
-    <p:sldId id="320" r:id="rId13"/>
-    <p:sldId id="283" r:id="rId14"/>
-    <p:sldId id="308" r:id="rId15"/>
-    <p:sldId id="309" r:id="rId16"/>
-    <p:sldId id="324" r:id="rId17"/>
-    <p:sldId id="326" r:id="rId18"/>
-    <p:sldId id="310" r:id="rId19"/>
-    <p:sldId id="321" r:id="rId20"/>
-    <p:sldId id="325" r:id="rId21"/>
-    <p:sldId id="323" r:id="rId22"/>
-    <p:sldId id="312" r:id="rId23"/>
-    <p:sldId id="328" r:id="rId24"/>
-    <p:sldId id="330" r:id="rId25"/>
-    <p:sldId id="313" r:id="rId26"/>
+    <p:sldId id="331" r:id="rId11"/>
+    <p:sldId id="319" r:id="rId12"/>
+    <p:sldId id="268" r:id="rId13"/>
+    <p:sldId id="320" r:id="rId14"/>
+    <p:sldId id="283" r:id="rId15"/>
+    <p:sldId id="308" r:id="rId16"/>
+    <p:sldId id="309" r:id="rId17"/>
+    <p:sldId id="324" r:id="rId18"/>
+    <p:sldId id="326" r:id="rId19"/>
+    <p:sldId id="310" r:id="rId20"/>
+    <p:sldId id="321" r:id="rId21"/>
+    <p:sldId id="325" r:id="rId22"/>
+    <p:sldId id="323" r:id="rId23"/>
+    <p:sldId id="312" r:id="rId24"/>
+    <p:sldId id="328" r:id="rId25"/>
+    <p:sldId id="330" r:id="rId26"/>
+    <p:sldId id="313" r:id="rId27"/>
   </p:sldIdLst>
   <p:sldSz cx="12192000" cy="6858000"/>
   <p:notesSz cx="6858000" cy="9144000"/>
@@ -283,7 +284,7 @@
           <a:p>
             <a:fld id="{76586147-1295-4C85-B48B-BFD57414E2B2}" type="datetimeFigureOut">
               <a:rPr lang="en-US" smtClean="0"/>
-              <a:t>2/19/2019</a:t>
+              <a:t>2/23/2019</a:t>
             </a:fld>
             <a:endParaRPr lang="en-US"/>
           </a:p>
@@ -689,7 +690,7 @@
           <a:p>
             <a:fld id="{76586147-1295-4C85-B48B-BFD57414E2B2}" type="datetimeFigureOut">
               <a:rPr lang="en-US" smtClean="0"/>
-              <a:t>2/19/2019</a:t>
+              <a:t>2/23/2019</a:t>
             </a:fld>
             <a:endParaRPr lang="en-US"/>
           </a:p>
@@ -1107,7 +1108,7 @@
           <a:p>
             <a:fld id="{76586147-1295-4C85-B48B-BFD57414E2B2}" type="datetimeFigureOut">
               <a:rPr lang="en-US" smtClean="0"/>
-              <a:t>2/19/2019</a:t>
+              <a:t>2/23/2019</a:t>
             </a:fld>
             <a:endParaRPr lang="en-US"/>
           </a:p>
@@ -1515,7 +1516,7 @@
           <a:p>
             <a:fld id="{76586147-1295-4C85-B48B-BFD57414E2B2}" type="datetimeFigureOut">
               <a:rPr lang="en-US" smtClean="0"/>
-              <a:t>2/19/2019</a:t>
+              <a:t>2/23/2019</a:t>
             </a:fld>
             <a:endParaRPr lang="en-US"/>
           </a:p>
@@ -1998,7 +1999,7 @@
           <a:p>
             <a:fld id="{76586147-1295-4C85-B48B-BFD57414E2B2}" type="datetimeFigureOut">
               <a:rPr lang="en-US" smtClean="0"/>
-              <a:t>2/19/2019</a:t>
+              <a:t>2/23/2019</a:t>
             </a:fld>
             <a:endParaRPr lang="en-US"/>
           </a:p>
@@ -2471,7 +2472,7 @@
           <a:p>
             <a:fld id="{76586147-1295-4C85-B48B-BFD57414E2B2}" type="datetimeFigureOut">
               <a:rPr lang="en-US" smtClean="0"/>
-              <a:t>2/19/2019</a:t>
+              <a:t>2/23/2019</a:t>
             </a:fld>
             <a:endParaRPr lang="en-US"/>
           </a:p>
@@ -3091,7 +3092,7 @@
           <a:p>
             <a:fld id="{76586147-1295-4C85-B48B-BFD57414E2B2}" type="datetimeFigureOut">
               <a:rPr lang="en-US" smtClean="0"/>
-              <a:t>2/19/2019</a:t>
+              <a:t>2/23/2019</a:t>
             </a:fld>
             <a:endParaRPr lang="en-US"/>
           </a:p>
@@ -3446,7 +3447,7 @@
           <a:p>
             <a:fld id="{76586147-1295-4C85-B48B-BFD57414E2B2}" type="datetimeFigureOut">
               <a:rPr lang="en-US" smtClean="0"/>
-              <a:t>2/19/2019</a:t>
+              <a:t>2/23/2019</a:t>
             </a:fld>
             <a:endParaRPr lang="en-US"/>
           </a:p>
@@ -3767,7 +3768,7 @@
           <a:p>
             <a:fld id="{76586147-1295-4C85-B48B-BFD57414E2B2}" type="datetimeFigureOut">
               <a:rPr lang="en-US" smtClean="0"/>
-              <a:t>2/19/2019</a:t>
+              <a:t>2/23/2019</a:t>
             </a:fld>
             <a:endParaRPr lang="en-US"/>
           </a:p>
@@ -4286,7 +4287,7 @@
           <a:p>
             <a:fld id="{76586147-1295-4C85-B48B-BFD57414E2B2}" type="datetimeFigureOut">
               <a:rPr lang="en-US" smtClean="0"/>
-              <a:t>2/19/2019</a:t>
+              <a:t>2/23/2019</a:t>
             </a:fld>
             <a:endParaRPr lang="en-US"/>
           </a:p>
@@ -4785,7 +4786,7 @@
           <a:p>
             <a:fld id="{76586147-1295-4C85-B48B-BFD57414E2B2}" type="datetimeFigureOut">
               <a:rPr lang="en-US" smtClean="0"/>
-              <a:t>2/19/2019</a:t>
+              <a:t>2/23/2019</a:t>
             </a:fld>
             <a:endParaRPr lang="en-US"/>
           </a:p>
@@ -5260,7 +5261,7 @@
           <a:p>
             <a:fld id="{76586147-1295-4C85-B48B-BFD57414E2B2}" type="datetimeFigureOut">
               <a:rPr lang="en-US" smtClean="0"/>
-              <a:t>2/19/2019</a:t>
+              <a:t>2/23/2019</a:t>
             </a:fld>
             <a:endParaRPr lang="en-US"/>
           </a:p>
@@ -5765,7 +5766,7 @@
           <p:cNvPr id="2" name="Title 1">
             <a:extLst>
               <a:ext uri="{FF2B5EF4-FFF2-40B4-BE49-F238E27FC236}">
-                <a16:creationId xmlns:a16="http://schemas.microsoft.com/office/drawing/2014/main" id="{5C66F505-B8FC-4203-A564-CD3F9FE87D21}"/>
+                <a16:creationId xmlns:a16="http://schemas.microsoft.com/office/drawing/2014/main" id="{8F3C2353-D7C4-4040-916A-0527F43EAEE9}"/>
               </a:ext>
             </a:extLst>
           </p:cNvPr>
@@ -5782,48 +5783,221 @@
           <a:lstStyle/>
           <a:p>
             <a:r>
-              <a:rPr lang="en-US" dirty="0" err="1"/>
-              <a:t>PyDoc</a:t>
-            </a:r>
-            <a:endParaRPr lang="en-US" dirty="0"/>
+              <a:rPr lang="en-US" dirty="0"/>
+              <a:t>Help</a:t>
+            </a:r>
           </a:p>
         </p:txBody>
       </p:sp>
-      <p:pic>
-        <p:nvPicPr>
-          <p:cNvPr id="4" name="Content Placeholder 3">
-            <a:extLst>
-              <a:ext uri="{FF2B5EF4-FFF2-40B4-BE49-F238E27FC236}">
-                <a16:creationId xmlns:a16="http://schemas.microsoft.com/office/drawing/2014/main" id="{87C3D02E-84AA-49AF-94A5-802699B6A64D}"/>
-              </a:ext>
-            </a:extLst>
-          </p:cNvPr>
-          <p:cNvPicPr>
-            <a:picLocks noGrp="1" noChangeAspect="1"/>
-          </p:cNvPicPr>
+      <p:sp>
+        <p:nvSpPr>
+          <p:cNvPr id="6" name="Content Placeholder 5">
+            <a:extLst>
+              <a:ext uri="{FF2B5EF4-FFF2-40B4-BE49-F238E27FC236}">
+                <a16:creationId xmlns:a16="http://schemas.microsoft.com/office/drawing/2014/main" id="{C5C4E50C-4F60-4FE6-905D-6E67AC844D42}"/>
+              </a:ext>
+            </a:extLst>
+          </p:cNvPr>
+          <p:cNvSpPr>
+            <a:spLocks noGrp="1"/>
+          </p:cNvSpPr>
           <p:nvPr>
             <p:ph idx="1"/>
           </p:nvPr>
-        </p:nvPicPr>
-        <p:blipFill rotWithShape="1">
-          <a:blip r:embed="rId2"/>
-          <a:srcRect t="16584"/>
-          <a:stretch/>
-        </p:blipFill>
+        </p:nvSpPr>
         <p:spPr>
           <a:xfrm>
-            <a:off x="3552958" y="483282"/>
-            <a:ext cx="8132111" cy="6290704"/>
+            <a:off x="838200" y="1825625"/>
+            <a:ext cx="10515600" cy="4826962"/>
           </a:xfrm>
           <a:prstGeom prst="rect">
             <a:avLst/>
           </a:prstGeom>
-        </p:spPr>
-      </p:pic>
+          <a:solidFill>
+            <a:schemeClr val="bg2">
+              <a:lumMod val="25000"/>
+            </a:schemeClr>
+          </a:solidFill>
+        </p:spPr>
+        <p:txBody>
+          <a:bodyPr wrap="square">
+            <a:spAutoFit/>
+          </a:bodyPr>
+          <a:lstStyle/>
+          <a:p>
+            <a:pPr marL="0" indent="0">
+              <a:buNone/>
+            </a:pPr>
+            <a:r>
+              <a:rPr lang="en-US" sz="2000" dirty="0">
+                <a:solidFill>
+                  <a:srgbClr val="DCDCAA"/>
+                </a:solidFill>
+                <a:latin typeface="Consolas" panose="020B0609020204030204" pitchFamily="49" charset="0"/>
+              </a:rPr>
+              <a:t>help</a:t>
+            </a:r>
+            <a:r>
+              <a:rPr lang="en-US" sz="2000" dirty="0">
+                <a:solidFill>
+                  <a:srgbClr val="D4D4D4"/>
+                </a:solidFill>
+                <a:latin typeface="Consolas" panose="020B0609020204030204" pitchFamily="49" charset="0"/>
+              </a:rPr>
+              <a:t>(calculator)</a:t>
+            </a:r>
+          </a:p>
+          <a:p>
+            <a:pPr marL="0" indent="0">
+              <a:buNone/>
+            </a:pPr>
+            <a:r>
+              <a:rPr lang="en-US" sz="2000" dirty="0">
+                <a:solidFill>
+                  <a:srgbClr val="D4D4D4"/>
+                </a:solidFill>
+                <a:latin typeface="Consolas" panose="020B0609020204030204" pitchFamily="49" charset="0"/>
+              </a:rPr>
+              <a:t>________________________________________________________________________</a:t>
+            </a:r>
+          </a:p>
+          <a:p>
+            <a:pPr marL="0" indent="0">
+              <a:buNone/>
+            </a:pPr>
+            <a:r>
+              <a:rPr lang="en-US" sz="2000" dirty="0">
+                <a:solidFill>
+                  <a:srgbClr val="D4D4D4"/>
+                </a:solidFill>
+                <a:latin typeface="Consolas" panose="020B0609020204030204" pitchFamily="49" charset="0"/>
+              </a:rPr>
+              <a:t>Help on module calculator:</a:t>
+            </a:r>
+          </a:p>
+          <a:p>
+            <a:pPr marL="0" indent="0">
+              <a:buNone/>
+            </a:pPr>
+            <a:endParaRPr lang="en-US" sz="2000" dirty="0">
+              <a:solidFill>
+                <a:srgbClr val="D4D4D4"/>
+              </a:solidFill>
+              <a:latin typeface="Consolas" panose="020B0609020204030204" pitchFamily="49" charset="0"/>
+            </a:endParaRPr>
+          </a:p>
+          <a:p>
+            <a:pPr marL="0" indent="0">
+              <a:buNone/>
+            </a:pPr>
+            <a:r>
+              <a:rPr lang="en-US" sz="2000" dirty="0">
+                <a:solidFill>
+                  <a:srgbClr val="D4D4D4"/>
+                </a:solidFill>
+                <a:latin typeface="Consolas" panose="020B0609020204030204" pitchFamily="49" charset="0"/>
+              </a:rPr>
+              <a:t>NAME</a:t>
+            </a:r>
+          </a:p>
+          <a:p>
+            <a:pPr marL="0" indent="0">
+              <a:buNone/>
+            </a:pPr>
+            <a:r>
+              <a:rPr lang="en-US" sz="2000" dirty="0">
+                <a:solidFill>
+                  <a:srgbClr val="D4D4D4"/>
+                </a:solidFill>
+                <a:latin typeface="Consolas" panose="020B0609020204030204" pitchFamily="49" charset="0"/>
+              </a:rPr>
+              <a:t>    calculator</a:t>
+            </a:r>
+          </a:p>
+          <a:p>
+            <a:pPr marL="0" indent="0">
+              <a:buNone/>
+            </a:pPr>
+            <a:endParaRPr lang="en-US" sz="2000" dirty="0">
+              <a:solidFill>
+                <a:srgbClr val="D4D4D4"/>
+              </a:solidFill>
+              <a:latin typeface="Consolas" panose="020B0609020204030204" pitchFamily="49" charset="0"/>
+            </a:endParaRPr>
+          </a:p>
+          <a:p>
+            <a:pPr marL="0" indent="0">
+              <a:buNone/>
+            </a:pPr>
+            <a:r>
+              <a:rPr lang="en-US" sz="2000" dirty="0">
+                <a:solidFill>
+                  <a:srgbClr val="D4D4D4"/>
+                </a:solidFill>
+                <a:latin typeface="Consolas" panose="020B0609020204030204" pitchFamily="49" charset="0"/>
+              </a:rPr>
+              <a:t>DESCRIPTION</a:t>
+            </a:r>
+          </a:p>
+          <a:p>
+            <a:pPr marL="0" indent="0">
+              <a:buNone/>
+            </a:pPr>
+            <a:r>
+              <a:rPr lang="en-US" sz="2000" dirty="0">
+                <a:solidFill>
+                  <a:srgbClr val="D4D4D4"/>
+                </a:solidFill>
+                <a:latin typeface="Consolas" panose="020B0609020204030204" pitchFamily="49" charset="0"/>
+              </a:rPr>
+              <a:t>    Calculator Documentation</a:t>
+            </a:r>
+          </a:p>
+          <a:p>
+            <a:pPr marL="0" indent="0">
+              <a:buNone/>
+            </a:pPr>
+            <a:r>
+              <a:rPr lang="en-US" sz="2000" dirty="0">
+                <a:solidFill>
+                  <a:srgbClr val="D4D4D4"/>
+                </a:solidFill>
+                <a:latin typeface="Consolas" panose="020B0609020204030204" pitchFamily="49" charset="0"/>
+              </a:rPr>
+              <a:t>    This class holds the calculator functions and memory variables.</a:t>
+            </a:r>
+          </a:p>
+          <a:p>
+            <a:pPr marL="0" indent="0">
+              <a:buNone/>
+            </a:pPr>
+            <a:endParaRPr lang="en-US" sz="2000" dirty="0">
+              <a:solidFill>
+                <a:srgbClr val="D4D4D4"/>
+              </a:solidFill>
+              <a:latin typeface="Consolas" panose="020B0609020204030204" pitchFamily="49" charset="0"/>
+            </a:endParaRPr>
+          </a:p>
+          <a:p>
+            <a:pPr marL="0" indent="0">
+              <a:buNone/>
+            </a:pPr>
+            <a:r>
+              <a:rPr lang="en-US" sz="2000" dirty="0">
+                <a:solidFill>
+                  <a:srgbClr val="D4D4D4"/>
+                </a:solidFill>
+                <a:latin typeface="Consolas" panose="020B0609020204030204" pitchFamily="49" charset="0"/>
+              </a:rPr>
+              <a:t>-- More  --</a:t>
+            </a:r>
+          </a:p>
+        </p:txBody>
+      </p:sp>
     </p:spTree>
     <p:extLst>
       <p:ext uri="{BB962C8B-B14F-4D97-AF65-F5344CB8AC3E}">
-        <p14:creationId xmlns:p14="http://schemas.microsoft.com/office/powerpoint/2010/main" val="1654294047"/>
+        <p14:creationId xmlns:p14="http://schemas.microsoft.com/office/powerpoint/2010/main" val="3141329009"/>
       </p:ext>
     </p:extLst>
   </p:cSld>
@@ -5855,7 +6029,7 @@
           <p:cNvPr id="2" name="Title 1">
             <a:extLst>
               <a:ext uri="{FF2B5EF4-FFF2-40B4-BE49-F238E27FC236}">
-                <a16:creationId xmlns:a16="http://schemas.microsoft.com/office/drawing/2014/main" id="{261C0A93-96AA-44E0-B3D6-FF0275AF9274}"/>
+                <a16:creationId xmlns:a16="http://schemas.microsoft.com/office/drawing/2014/main" id="{5C66F505-B8FC-4203-A564-CD3F9FE87D21}"/>
               </a:ext>
             </a:extLst>
           </p:cNvPr>
@@ -5863,7 +6037,7 @@
             <a:spLocks noGrp="1"/>
           </p:cNvSpPr>
           <p:nvPr>
-            <p:ph type="ctrTitle"/>
+            <p:ph type="title"/>
           </p:nvPr>
         </p:nvSpPr>
         <p:spPr/>
@@ -5872,41 +6046,48 @@
           <a:lstStyle/>
           <a:p>
             <a:r>
-              <a:rPr lang="en-US" dirty="0"/>
-              <a:t>Error Handling</a:t>
-            </a:r>
+              <a:rPr lang="en-US" dirty="0" err="1"/>
+              <a:t>PyDoc</a:t>
+            </a:r>
+            <a:endParaRPr lang="en-US" dirty="0"/>
           </a:p>
         </p:txBody>
       </p:sp>
-      <p:sp>
-        <p:nvSpPr>
-          <p:cNvPr id="3" name="Subtitle 2">
-            <a:extLst>
-              <a:ext uri="{FF2B5EF4-FFF2-40B4-BE49-F238E27FC236}">
-                <a16:creationId xmlns:a16="http://schemas.microsoft.com/office/drawing/2014/main" id="{B2892487-6D5E-41D3-98F0-29EC71A8422C}"/>
-              </a:ext>
-            </a:extLst>
-          </p:cNvPr>
-          <p:cNvSpPr>
-            <a:spLocks noGrp="1"/>
-          </p:cNvSpPr>
+      <p:pic>
+        <p:nvPicPr>
+          <p:cNvPr id="4" name="Content Placeholder 3">
+            <a:extLst>
+              <a:ext uri="{FF2B5EF4-FFF2-40B4-BE49-F238E27FC236}">
+                <a16:creationId xmlns:a16="http://schemas.microsoft.com/office/drawing/2014/main" id="{87C3D02E-84AA-49AF-94A5-802699B6A64D}"/>
+              </a:ext>
+            </a:extLst>
+          </p:cNvPr>
+          <p:cNvPicPr>
+            <a:picLocks noGrp="1" noChangeAspect="1"/>
+          </p:cNvPicPr>
           <p:nvPr>
-            <p:ph type="subTitle" idx="1"/>
+            <p:ph idx="1"/>
           </p:nvPr>
-        </p:nvSpPr>
-        <p:spPr/>
-        <p:txBody>
-          <a:bodyPr/>
-          <a:lstStyle/>
-          <a:p>
-            <a:endParaRPr lang="en-US" dirty="0"/>
-          </a:p>
-        </p:txBody>
-      </p:sp>
+        </p:nvPicPr>
+        <p:blipFill rotWithShape="1">
+          <a:blip r:embed="rId2"/>
+          <a:srcRect t="16584"/>
+          <a:stretch/>
+        </p:blipFill>
+        <p:spPr>
+          <a:xfrm>
+            <a:off x="3552958" y="483282"/>
+            <a:ext cx="8132111" cy="6290704"/>
+          </a:xfrm>
+          <a:prstGeom prst="rect">
+            <a:avLst/>
+          </a:prstGeom>
+        </p:spPr>
+      </p:pic>
     </p:spTree>
     <p:extLst>
       <p:ext uri="{BB962C8B-B14F-4D97-AF65-F5344CB8AC3E}">
-        <p14:creationId xmlns:p14="http://schemas.microsoft.com/office/powerpoint/2010/main" val="1087091554"/>
+        <p14:creationId xmlns:p14="http://schemas.microsoft.com/office/powerpoint/2010/main" val="1654294047"/>
       </p:ext>
     </p:extLst>
   </p:cSld>
@@ -5938,7 +6119,7 @@
           <p:cNvPr id="2" name="Title 1">
             <a:extLst>
               <a:ext uri="{FF2B5EF4-FFF2-40B4-BE49-F238E27FC236}">
-                <a16:creationId xmlns:a16="http://schemas.microsoft.com/office/drawing/2014/main" id="{BFF48EFD-024D-41F5-8BEF-159CFCA611C4}"/>
+                <a16:creationId xmlns:a16="http://schemas.microsoft.com/office/drawing/2014/main" id="{261C0A93-96AA-44E0-B3D6-FF0275AF9274}"/>
               </a:ext>
             </a:extLst>
           </p:cNvPr>
@@ -5946,7 +6127,7 @@
             <a:spLocks noGrp="1"/>
           </p:cNvSpPr>
           <p:nvPr>
-            <p:ph type="title"/>
+            <p:ph type="ctrTitle"/>
           </p:nvPr>
         </p:nvSpPr>
         <p:spPr/>
@@ -5955,18 +6136,18 @@
           <a:lstStyle/>
           <a:p>
             <a:r>
-              <a:rPr lang="en-US" i="1" dirty="0"/>
-              <a:t>Learning Python p.1127</a:t>
+              <a:rPr lang="en-US" dirty="0"/>
+              <a:t>Error Handling</a:t>
             </a:r>
           </a:p>
         </p:txBody>
       </p:sp>
       <p:sp>
         <p:nvSpPr>
-          <p:cNvPr id="3" name="Content Placeholder 2">
-            <a:extLst>
-              <a:ext uri="{FF2B5EF4-FFF2-40B4-BE49-F238E27FC236}">
-                <a16:creationId xmlns:a16="http://schemas.microsoft.com/office/drawing/2014/main" id="{1BF90119-D247-49C2-B362-3F07E9B1317C}"/>
+          <p:cNvPr id="3" name="Subtitle 2">
+            <a:extLst>
+              <a:ext uri="{FF2B5EF4-FFF2-40B4-BE49-F238E27FC236}">
+                <a16:creationId xmlns:a16="http://schemas.microsoft.com/office/drawing/2014/main" id="{B2892487-6D5E-41D3-98F0-29EC71A8422C}"/>
               </a:ext>
             </a:extLst>
           </p:cNvPr>
@@ -5974,7 +6155,7 @@
             <a:spLocks noGrp="1"/>
           </p:cNvSpPr>
           <p:nvPr>
-            <p:ph idx="1"/>
+            <p:ph type="subTitle" idx="1"/>
           </p:nvPr>
         </p:nvSpPr>
         <p:spPr/>
@@ -5982,20 +6163,14 @@
           <a:bodyPr/>
           <a:lstStyle/>
           <a:p>
-            <a:pPr marL="0" indent="0">
-              <a:buNone/>
-            </a:pPr>
-            <a:r>
-              <a:rPr lang="en-US" dirty="0"/>
-              <a:t>“In fact, realistic C programs often have as much code devoted to error detection as to doing actual work. But in Python, you don’t have to be so methodical (and neurotic!).”</a:t>
-            </a:r>
+            <a:endParaRPr lang="en-US" dirty="0"/>
           </a:p>
         </p:txBody>
       </p:sp>
     </p:spTree>
     <p:extLst>
       <p:ext uri="{BB962C8B-B14F-4D97-AF65-F5344CB8AC3E}">
-        <p14:creationId xmlns:p14="http://schemas.microsoft.com/office/powerpoint/2010/main" val="443609630"/>
+        <p14:creationId xmlns:p14="http://schemas.microsoft.com/office/powerpoint/2010/main" val="1087091554"/>
       </p:ext>
     </p:extLst>
   </p:cSld>
@@ -6027,7 +6202,7 @@
           <p:cNvPr id="2" name="Title 1">
             <a:extLst>
               <a:ext uri="{FF2B5EF4-FFF2-40B4-BE49-F238E27FC236}">
-                <a16:creationId xmlns:a16="http://schemas.microsoft.com/office/drawing/2014/main" id="{8F3C2353-D7C4-4040-916A-0527F43EAEE9}"/>
+                <a16:creationId xmlns:a16="http://schemas.microsoft.com/office/drawing/2014/main" id="{BFF48EFD-024D-41F5-8BEF-159CFCA611C4}"/>
               </a:ext>
             </a:extLst>
           </p:cNvPr>
@@ -6038,559 +6213,53 @@
             <p:ph type="title"/>
           </p:nvPr>
         </p:nvSpPr>
-        <p:spPr>
-          <a:xfrm>
-            <a:off x="838200" y="374750"/>
-            <a:ext cx="10515600" cy="1325563"/>
-          </a:xfrm>
-        </p:spPr>
+        <p:spPr/>
         <p:txBody>
           <a:bodyPr/>
           <a:lstStyle/>
           <a:p>
             <a:r>
-              <a:rPr lang="en-US" dirty="0"/>
-              <a:t>C++</a:t>
+              <a:rPr lang="en-US" i="1" dirty="0"/>
+              <a:t>Learning Python p.1127</a:t>
             </a:r>
           </a:p>
         </p:txBody>
       </p:sp>
       <p:sp>
         <p:nvSpPr>
-          <p:cNvPr id="6" name="Content Placeholder 2">
-            <a:extLst>
-              <a:ext uri="{FF2B5EF4-FFF2-40B4-BE49-F238E27FC236}">
-                <a16:creationId xmlns:a16="http://schemas.microsoft.com/office/drawing/2014/main" id="{B7478F0E-4980-F64C-A6A9-63D4FD84C0E7}"/>
-              </a:ext>
-            </a:extLst>
-          </p:cNvPr>
-          <p:cNvSpPr txBox="1">
-            <a:spLocks/>
+          <p:cNvPr id="3" name="Content Placeholder 2">
+            <a:extLst>
+              <a:ext uri="{FF2B5EF4-FFF2-40B4-BE49-F238E27FC236}">
+                <a16:creationId xmlns:a16="http://schemas.microsoft.com/office/drawing/2014/main" id="{1BF90119-D247-49C2-B362-3F07E9B1317C}"/>
+              </a:ext>
+            </a:extLst>
+          </p:cNvPr>
+          <p:cNvSpPr>
+            <a:spLocks noGrp="1"/>
           </p:cNvSpPr>
-          <p:nvPr/>
+          <p:nvPr>
+            <p:ph idx="1"/>
+          </p:nvPr>
         </p:nvSpPr>
-        <p:spPr>
-          <a:xfrm>
-            <a:off x="838200" y="4178853"/>
-            <a:ext cx="10515600" cy="510980"/>
-          </a:xfrm>
-          <a:prstGeom prst="rect">
-            <a:avLst/>
-          </a:prstGeom>
-        </p:spPr>
+        <p:spPr/>
         <p:txBody>
-          <a:bodyPr vert="horz" lIns="91440" tIns="45720" rIns="91440" bIns="45720" rtlCol="0">
-            <a:normAutofit lnSpcReduction="10000"/>
-          </a:bodyPr>
-          <a:lstStyle>
-            <a:lvl1pPr marL="228600" indent="-228600" algn="l" defTabSz="914400" rtl="0" eaLnBrk="1" latinLnBrk="0" hangingPunct="1">
-              <a:lnSpc>
-                <a:spcPct val="90000"/>
-              </a:lnSpc>
-              <a:spcBef>
-                <a:spcPts val="1000"/>
-              </a:spcBef>
-              <a:buFont typeface="Arial" panose="020B0604020202020204" pitchFamily="34" charset="0"/>
-              <a:buChar char="•"/>
-              <a:defRPr sz="2800" kern="1200">
-                <a:solidFill>
-                  <a:schemeClr val="tx1"/>
-                </a:solidFill>
-                <a:latin typeface="+mn-lt"/>
-                <a:ea typeface="+mn-ea"/>
-                <a:cs typeface="+mn-cs"/>
-              </a:defRPr>
-            </a:lvl1pPr>
-            <a:lvl2pPr marL="685800" indent="-228600" algn="l" defTabSz="914400" rtl="0" eaLnBrk="1" latinLnBrk="0" hangingPunct="1">
-              <a:lnSpc>
-                <a:spcPct val="90000"/>
-              </a:lnSpc>
-              <a:spcBef>
-                <a:spcPts val="500"/>
-              </a:spcBef>
-              <a:buFont typeface="Arial" panose="020B0604020202020204" pitchFamily="34" charset="0"/>
-              <a:buChar char="•"/>
-              <a:defRPr sz="2400" kern="1200">
-                <a:solidFill>
-                  <a:schemeClr val="tx1"/>
-                </a:solidFill>
-                <a:latin typeface="+mn-lt"/>
-                <a:ea typeface="+mn-ea"/>
-                <a:cs typeface="+mn-cs"/>
-              </a:defRPr>
-            </a:lvl2pPr>
-            <a:lvl3pPr marL="1143000" indent="-228600" algn="l" defTabSz="914400" rtl="0" eaLnBrk="1" latinLnBrk="0" hangingPunct="1">
-              <a:lnSpc>
-                <a:spcPct val="90000"/>
-              </a:lnSpc>
-              <a:spcBef>
-                <a:spcPts val="500"/>
-              </a:spcBef>
-              <a:buFont typeface="Arial" panose="020B0604020202020204" pitchFamily="34" charset="0"/>
-              <a:buChar char="•"/>
-              <a:defRPr sz="2000" kern="1200">
-                <a:solidFill>
-                  <a:schemeClr val="tx1"/>
-                </a:solidFill>
-                <a:latin typeface="+mn-lt"/>
-                <a:ea typeface="+mn-ea"/>
-                <a:cs typeface="+mn-cs"/>
-              </a:defRPr>
-            </a:lvl3pPr>
-            <a:lvl4pPr marL="1600200" indent="-228600" algn="l" defTabSz="914400" rtl="0" eaLnBrk="1" latinLnBrk="0" hangingPunct="1">
-              <a:lnSpc>
-                <a:spcPct val="90000"/>
-              </a:lnSpc>
-              <a:spcBef>
-                <a:spcPts val="500"/>
-              </a:spcBef>
-              <a:buFont typeface="Arial" panose="020B0604020202020204" pitchFamily="34" charset="0"/>
-              <a:buChar char="•"/>
-              <a:defRPr sz="1800" kern="1200">
-                <a:solidFill>
-                  <a:schemeClr val="tx1"/>
-                </a:solidFill>
-                <a:latin typeface="+mn-lt"/>
-                <a:ea typeface="+mn-ea"/>
-                <a:cs typeface="+mn-cs"/>
-              </a:defRPr>
-            </a:lvl4pPr>
-            <a:lvl5pPr marL="2057400" indent="-228600" algn="l" defTabSz="914400" rtl="0" eaLnBrk="1" latinLnBrk="0" hangingPunct="1">
-              <a:lnSpc>
-                <a:spcPct val="90000"/>
-              </a:lnSpc>
-              <a:spcBef>
-                <a:spcPts val="500"/>
-              </a:spcBef>
-              <a:buFont typeface="Arial" panose="020B0604020202020204" pitchFamily="34" charset="0"/>
-              <a:buChar char="•"/>
-              <a:defRPr sz="1800" kern="1200">
-                <a:solidFill>
-                  <a:schemeClr val="tx1"/>
-                </a:solidFill>
-                <a:latin typeface="+mn-lt"/>
-                <a:ea typeface="+mn-ea"/>
-                <a:cs typeface="+mn-cs"/>
-              </a:defRPr>
-            </a:lvl5pPr>
-            <a:lvl6pPr marL="2514600" indent="-228600" algn="l" defTabSz="914400" rtl="0" eaLnBrk="1" latinLnBrk="0" hangingPunct="1">
-              <a:lnSpc>
-                <a:spcPct val="90000"/>
-              </a:lnSpc>
-              <a:spcBef>
-                <a:spcPts val="500"/>
-              </a:spcBef>
-              <a:buFont typeface="Arial" panose="020B0604020202020204" pitchFamily="34" charset="0"/>
-              <a:buChar char="•"/>
-              <a:defRPr sz="1800" kern="1200">
-                <a:solidFill>
-                  <a:schemeClr val="tx1"/>
-                </a:solidFill>
-                <a:latin typeface="+mn-lt"/>
-                <a:ea typeface="+mn-ea"/>
-                <a:cs typeface="+mn-cs"/>
-              </a:defRPr>
-            </a:lvl6pPr>
-            <a:lvl7pPr marL="2971800" indent="-228600" algn="l" defTabSz="914400" rtl="0" eaLnBrk="1" latinLnBrk="0" hangingPunct="1">
-              <a:lnSpc>
-                <a:spcPct val="90000"/>
-              </a:lnSpc>
-              <a:spcBef>
-                <a:spcPts val="500"/>
-              </a:spcBef>
-              <a:buFont typeface="Arial" panose="020B0604020202020204" pitchFamily="34" charset="0"/>
-              <a:buChar char="•"/>
-              <a:defRPr sz="1800" kern="1200">
-                <a:solidFill>
-                  <a:schemeClr val="tx1"/>
-                </a:solidFill>
-                <a:latin typeface="+mn-lt"/>
-                <a:ea typeface="+mn-ea"/>
-                <a:cs typeface="+mn-cs"/>
-              </a:defRPr>
-            </a:lvl7pPr>
-            <a:lvl8pPr marL="3429000" indent="-228600" algn="l" defTabSz="914400" rtl="0" eaLnBrk="1" latinLnBrk="0" hangingPunct="1">
-              <a:lnSpc>
-                <a:spcPct val="90000"/>
-              </a:lnSpc>
-              <a:spcBef>
-                <a:spcPts val="500"/>
-              </a:spcBef>
-              <a:buFont typeface="Arial" panose="020B0604020202020204" pitchFamily="34" charset="0"/>
-              <a:buChar char="•"/>
-              <a:defRPr sz="1800" kern="1200">
-                <a:solidFill>
-                  <a:schemeClr val="tx1"/>
-                </a:solidFill>
-                <a:latin typeface="+mn-lt"/>
-                <a:ea typeface="+mn-ea"/>
-                <a:cs typeface="+mn-cs"/>
-              </a:defRPr>
-            </a:lvl8pPr>
-            <a:lvl9pPr marL="3886200" indent="-228600" algn="l" defTabSz="914400" rtl="0" eaLnBrk="1" latinLnBrk="0" hangingPunct="1">
-              <a:lnSpc>
-                <a:spcPct val="90000"/>
-              </a:lnSpc>
-              <a:spcBef>
-                <a:spcPts val="500"/>
-              </a:spcBef>
-              <a:buFont typeface="Arial" panose="020B0604020202020204" pitchFamily="34" charset="0"/>
-              <a:buChar char="•"/>
-              <a:defRPr sz="1800" kern="1200">
-                <a:solidFill>
-                  <a:schemeClr val="tx1"/>
-                </a:solidFill>
-                <a:latin typeface="+mn-lt"/>
-                <a:ea typeface="+mn-ea"/>
-                <a:cs typeface="+mn-cs"/>
-              </a:defRPr>
-            </a:lvl9pPr>
-          </a:lstStyle>
+          <a:bodyPr/>
+          <a:lstStyle/>
           <a:p>
             <a:pPr marL="0" indent="0">
-              <a:buFont typeface="Arial" panose="020B0604020202020204" pitchFamily="34" charset="0"/>
               <a:buNone/>
             </a:pPr>
             <a:r>
-              <a:rPr lang="en-US" sz="3200" dirty="0"/>
-              <a:t>The Python Way:</a:t>
-            </a:r>
-          </a:p>
-        </p:txBody>
-      </p:sp>
-      <p:sp>
-        <p:nvSpPr>
-          <p:cNvPr id="8" name="Rectangle 7">
-            <a:extLst>
-              <a:ext uri="{FF2B5EF4-FFF2-40B4-BE49-F238E27FC236}">
-                <a16:creationId xmlns:a16="http://schemas.microsoft.com/office/drawing/2014/main" id="{73BB6F64-CFD0-B249-BAC1-2682FF06EB4E}"/>
-              </a:ext>
-            </a:extLst>
-          </p:cNvPr>
-          <p:cNvSpPr/>
-          <p:nvPr/>
-        </p:nvSpPr>
-        <p:spPr>
-          <a:xfrm>
-            <a:off x="838200" y="1963126"/>
-            <a:ext cx="10515600" cy="2862322"/>
-          </a:xfrm>
-          <a:prstGeom prst="rect">
-            <a:avLst/>
-          </a:prstGeom>
-          <a:solidFill>
-            <a:schemeClr val="bg2">
-              <a:lumMod val="25000"/>
-            </a:schemeClr>
-          </a:solidFill>
-        </p:spPr>
-        <p:txBody>
-          <a:bodyPr wrap="square">
-            <a:spAutoFit/>
-          </a:bodyPr>
-          <a:lstStyle/>
-          <a:p>
-            <a:r>
-              <a:rPr lang="en-US" sz="2000" dirty="0">
-                <a:solidFill>
-                  <a:srgbClr val="C687C1"/>
-                </a:solidFill>
-                <a:latin typeface="Menlo-Regular"/>
-              </a:rPr>
-              <a:t>try </a:t>
-            </a:r>
-            <a:r>
-              <a:rPr lang="en-US" sz="2000" dirty="0">
-                <a:solidFill>
-                  <a:srgbClr val="D5D5D5"/>
-                </a:solidFill>
-                <a:latin typeface="Menlo-Regular"/>
-              </a:rPr>
-              <a:t>{</a:t>
-            </a:r>
-          </a:p>
-          <a:p>
-            <a:r>
-              <a:rPr lang="en-US" sz="2000" dirty="0">
-                <a:solidFill>
-                  <a:srgbClr val="6A9A55"/>
-                </a:solidFill>
-                <a:latin typeface="Menlo-Regular"/>
-              </a:rPr>
-              <a:t>	// code block to try</a:t>
-            </a:r>
-          </a:p>
-          <a:p>
-            <a:r>
-              <a:rPr lang="en-US" sz="2000" dirty="0">
-                <a:solidFill>
-                  <a:srgbClr val="D5D5D5"/>
-                </a:solidFill>
-                <a:latin typeface="Menlo-Regular"/>
-              </a:rPr>
-              <a:t>}</a:t>
-            </a:r>
-          </a:p>
-          <a:p>
-            <a:r>
-              <a:rPr lang="en-US" sz="2000" dirty="0">
-                <a:solidFill>
-                  <a:srgbClr val="C687C1"/>
-                </a:solidFill>
-                <a:latin typeface="Menlo-Regular"/>
-              </a:rPr>
-              <a:t>catch </a:t>
-            </a:r>
-            <a:r>
-              <a:rPr lang="en-US" sz="2000" dirty="0">
-                <a:solidFill>
-                  <a:srgbClr val="D5D5D5"/>
-                </a:solidFill>
-                <a:latin typeface="Menlo-Regular"/>
-              </a:rPr>
-              <a:t>(</a:t>
-            </a:r>
-            <a:r>
-              <a:rPr lang="en-US" sz="2000" dirty="0" err="1">
-                <a:solidFill>
-                  <a:srgbClr val="D5D5D5"/>
-                </a:solidFill>
-                <a:latin typeface="Menlo-Regular"/>
-              </a:rPr>
-              <a:t>invalid_argument</a:t>
-            </a:r>
-            <a:r>
-              <a:rPr lang="en-US" sz="2000" dirty="0">
-                <a:solidFill>
-                  <a:srgbClr val="D5D5D5"/>
-                </a:solidFill>
-                <a:latin typeface="Menlo-Regular"/>
-              </a:rPr>
-              <a:t>&amp; ex) {</a:t>
-            </a:r>
-          </a:p>
-          <a:p>
-            <a:r>
-              <a:rPr lang="en-US" sz="2000" dirty="0">
-                <a:solidFill>
-                  <a:srgbClr val="D5D5D5"/>
-                </a:solidFill>
-                <a:latin typeface="Menlo-Regular"/>
-              </a:rPr>
-              <a:t>	</a:t>
-            </a:r>
-            <a:r>
-              <a:rPr lang="en-US" sz="2000" dirty="0" err="1">
-                <a:solidFill>
-                  <a:srgbClr val="D5D5D5"/>
-                </a:solidFill>
-                <a:latin typeface="Menlo-Regular"/>
-              </a:rPr>
-              <a:t>cout</a:t>
-            </a:r>
-            <a:r>
-              <a:rPr lang="en-US" sz="2000" dirty="0">
-                <a:solidFill>
-                  <a:srgbClr val="D5D5D5"/>
-                </a:solidFill>
-                <a:latin typeface="Menlo-Regular"/>
-              </a:rPr>
-              <a:t> &lt;&lt; </a:t>
-            </a:r>
-            <a:r>
-              <a:rPr lang="en-US" sz="2000" dirty="0">
-                <a:solidFill>
-                  <a:srgbClr val="CF9278"/>
-                </a:solidFill>
-                <a:latin typeface="Menlo-Regular"/>
-              </a:rPr>
-              <a:t>"An invalid-argument exception occurred: " </a:t>
-            </a:r>
-            <a:r>
-              <a:rPr lang="en-US" sz="2000" dirty="0">
-                <a:solidFill>
-                  <a:srgbClr val="D5D5D5"/>
-                </a:solidFill>
-                <a:latin typeface="Menlo-Regular"/>
-              </a:rPr>
-              <a:t>&lt;&lt; </a:t>
-            </a:r>
-            <a:r>
-              <a:rPr lang="en-US" sz="2000" dirty="0" err="1">
-                <a:solidFill>
-                  <a:srgbClr val="D5D5D5"/>
-                </a:solidFill>
-                <a:latin typeface="Menlo-Regular"/>
-              </a:rPr>
-              <a:t>ex.</a:t>
-            </a:r>
-            <a:r>
-              <a:rPr lang="en-US" sz="2000" dirty="0" err="1">
-                <a:solidFill>
-                  <a:srgbClr val="DDDDAB"/>
-                </a:solidFill>
-                <a:latin typeface="Menlo-Regular"/>
-              </a:rPr>
-              <a:t>what</a:t>
-            </a:r>
-            <a:r>
-              <a:rPr lang="en-US" sz="2000" dirty="0">
-                <a:solidFill>
-                  <a:srgbClr val="DDDDAB"/>
-                </a:solidFill>
-                <a:latin typeface="Menlo-Regular"/>
-              </a:rPr>
-              <a:t> </a:t>
-            </a:r>
-            <a:r>
-              <a:rPr lang="en-US" sz="2000" dirty="0">
-                <a:solidFill>
-                  <a:srgbClr val="D5D5D5"/>
-                </a:solidFill>
-                <a:latin typeface="Menlo-Regular"/>
-              </a:rPr>
-              <a:t>() &lt;&lt; </a:t>
-            </a:r>
-            <a:r>
-              <a:rPr lang="en-US" sz="2000" dirty="0" err="1">
-                <a:solidFill>
-                  <a:srgbClr val="D5D5D5"/>
-                </a:solidFill>
-                <a:latin typeface="Menlo-Regular"/>
-              </a:rPr>
-              <a:t>endl</a:t>
-            </a:r>
-            <a:r>
-              <a:rPr lang="en-US" sz="2000" dirty="0">
-                <a:solidFill>
-                  <a:srgbClr val="D5D5D5"/>
-                </a:solidFill>
-                <a:latin typeface="Menlo-Regular"/>
-              </a:rPr>
-              <a:t>;</a:t>
-            </a:r>
-          </a:p>
-          <a:p>
-            <a:r>
-              <a:rPr lang="en-US" sz="2000" dirty="0">
-                <a:solidFill>
-                  <a:srgbClr val="D5D5D5"/>
-                </a:solidFill>
-                <a:latin typeface="Menlo-Regular"/>
-              </a:rPr>
-              <a:t>}</a:t>
-            </a:r>
-          </a:p>
-          <a:p>
-            <a:r>
-              <a:rPr lang="en-US" sz="2000" dirty="0">
-                <a:solidFill>
-                  <a:srgbClr val="C687C1"/>
-                </a:solidFill>
-                <a:latin typeface="Menlo-Regular"/>
-              </a:rPr>
-              <a:t>catch </a:t>
-            </a:r>
-            <a:r>
-              <a:rPr lang="en-US" sz="2000" dirty="0">
-                <a:solidFill>
-                  <a:srgbClr val="D5D5D5"/>
-                </a:solidFill>
-                <a:latin typeface="Menlo-Regular"/>
-              </a:rPr>
-              <a:t>(...) {</a:t>
-            </a:r>
-          </a:p>
-          <a:p>
-            <a:r>
-              <a:rPr lang="en-US" sz="2000" dirty="0">
-                <a:solidFill>
-                  <a:srgbClr val="D5D5D5"/>
-                </a:solidFill>
-                <a:latin typeface="Menlo-Regular"/>
-              </a:rPr>
-              <a:t>	</a:t>
-            </a:r>
-            <a:r>
-              <a:rPr lang="en-US" sz="2000" dirty="0" err="1">
-                <a:solidFill>
-                  <a:srgbClr val="D5D5D5"/>
-                </a:solidFill>
-                <a:latin typeface="Menlo-Regular"/>
-              </a:rPr>
-              <a:t>cout</a:t>
-            </a:r>
-            <a:r>
-              <a:rPr lang="en-US" sz="2000" dirty="0">
-                <a:solidFill>
-                  <a:srgbClr val="D5D5D5"/>
-                </a:solidFill>
-                <a:latin typeface="Menlo-Regular"/>
-              </a:rPr>
-              <a:t> &lt;&lt; </a:t>
-            </a:r>
-            <a:r>
-              <a:rPr lang="en-US" sz="2000" dirty="0">
-                <a:solidFill>
-                  <a:srgbClr val="CF9278"/>
-                </a:solidFill>
-                <a:latin typeface="Menlo-Regular"/>
-              </a:rPr>
-              <a:t>"Something besides an invalid-argument exception occurred" </a:t>
-            </a:r>
-            <a:r>
-              <a:rPr lang="en-US" sz="2000" dirty="0">
-                <a:solidFill>
-                  <a:srgbClr val="D5D5D5"/>
-                </a:solidFill>
-                <a:latin typeface="Menlo-Regular"/>
-              </a:rPr>
-              <a:t>&lt;&lt; </a:t>
-            </a:r>
-            <a:r>
-              <a:rPr lang="en-US" sz="2000" dirty="0" err="1">
-                <a:solidFill>
-                  <a:srgbClr val="D5D5D5"/>
-                </a:solidFill>
-                <a:latin typeface="Menlo-Regular"/>
-              </a:rPr>
-              <a:t>endl</a:t>
-            </a:r>
-            <a:r>
-              <a:rPr lang="en-US" sz="2000" dirty="0">
-                <a:solidFill>
-                  <a:srgbClr val="D5D5D5"/>
-                </a:solidFill>
-                <a:latin typeface="Menlo-Regular"/>
-              </a:rPr>
-              <a:t>;</a:t>
-            </a:r>
-          </a:p>
-          <a:p>
-            <a:r>
-              <a:rPr lang="en-US" sz="2000" dirty="0">
-                <a:solidFill>
-                  <a:srgbClr val="D5D5D5"/>
-                </a:solidFill>
-                <a:latin typeface="Menlo-Regular"/>
-              </a:rPr>
-              <a:t>}</a:t>
-            </a:r>
-            <a:endParaRPr lang="en-US" sz="2000" b="0" dirty="0">
-              <a:solidFill>
-                <a:srgbClr val="D4D4D4"/>
-              </a:solidFill>
-              <a:effectLst/>
-              <a:latin typeface="Courier New" panose="02070309020205020404" pitchFamily="49" charset="0"/>
-              <a:cs typeface="Courier New" panose="02070309020205020404" pitchFamily="49" charset="0"/>
-            </a:endParaRPr>
+              <a:rPr lang="en-US" dirty="0"/>
+              <a:t>“In fact, realistic C programs often have as much code devoted to error detection as to doing actual work. But in Python, you don’t have to be so methodical (and neurotic!).”</a:t>
+            </a:r>
           </a:p>
         </p:txBody>
       </p:sp>
     </p:spTree>
     <p:extLst>
       <p:ext uri="{BB962C8B-B14F-4D97-AF65-F5344CB8AC3E}">
-        <p14:creationId xmlns:p14="http://schemas.microsoft.com/office/powerpoint/2010/main" val="4222260773"/>
+        <p14:creationId xmlns:p14="http://schemas.microsoft.com/office/powerpoint/2010/main" val="443609630"/>
       </p:ext>
     </p:extLst>
   </p:cSld>
@@ -6633,14 +6302,222 @@
             <p:ph type="title"/>
           </p:nvPr>
         </p:nvSpPr>
-        <p:spPr/>
+        <p:spPr>
+          <a:xfrm>
+            <a:off x="838200" y="374750"/>
+            <a:ext cx="10515600" cy="1325563"/>
+          </a:xfrm>
+        </p:spPr>
         <p:txBody>
           <a:bodyPr/>
           <a:lstStyle/>
           <a:p>
             <a:r>
               <a:rPr lang="en-US" dirty="0"/>
-              <a:t>Python</a:t>
+              <a:t>C++</a:t>
+            </a:r>
+          </a:p>
+        </p:txBody>
+      </p:sp>
+      <p:sp>
+        <p:nvSpPr>
+          <p:cNvPr id="6" name="Content Placeholder 2">
+            <a:extLst>
+              <a:ext uri="{FF2B5EF4-FFF2-40B4-BE49-F238E27FC236}">
+                <a16:creationId xmlns:a16="http://schemas.microsoft.com/office/drawing/2014/main" id="{B7478F0E-4980-F64C-A6A9-63D4FD84C0E7}"/>
+              </a:ext>
+            </a:extLst>
+          </p:cNvPr>
+          <p:cNvSpPr txBox="1">
+            <a:spLocks/>
+          </p:cNvSpPr>
+          <p:nvPr/>
+        </p:nvSpPr>
+        <p:spPr>
+          <a:xfrm>
+            <a:off x="838200" y="4178853"/>
+            <a:ext cx="10515600" cy="510980"/>
+          </a:xfrm>
+          <a:prstGeom prst="rect">
+            <a:avLst/>
+          </a:prstGeom>
+        </p:spPr>
+        <p:txBody>
+          <a:bodyPr vert="horz" lIns="91440" tIns="45720" rIns="91440" bIns="45720" rtlCol="0">
+            <a:normAutofit lnSpcReduction="10000"/>
+          </a:bodyPr>
+          <a:lstStyle>
+            <a:lvl1pPr marL="228600" indent="-228600" algn="l" defTabSz="914400" rtl="0" eaLnBrk="1" latinLnBrk="0" hangingPunct="1">
+              <a:lnSpc>
+                <a:spcPct val="90000"/>
+              </a:lnSpc>
+              <a:spcBef>
+                <a:spcPts val="1000"/>
+              </a:spcBef>
+              <a:buFont typeface="Arial" panose="020B0604020202020204" pitchFamily="34" charset="0"/>
+              <a:buChar char="•"/>
+              <a:defRPr sz="2800" kern="1200">
+                <a:solidFill>
+                  <a:schemeClr val="tx1"/>
+                </a:solidFill>
+                <a:latin typeface="+mn-lt"/>
+                <a:ea typeface="+mn-ea"/>
+                <a:cs typeface="+mn-cs"/>
+              </a:defRPr>
+            </a:lvl1pPr>
+            <a:lvl2pPr marL="685800" indent="-228600" algn="l" defTabSz="914400" rtl="0" eaLnBrk="1" latinLnBrk="0" hangingPunct="1">
+              <a:lnSpc>
+                <a:spcPct val="90000"/>
+              </a:lnSpc>
+              <a:spcBef>
+                <a:spcPts val="500"/>
+              </a:spcBef>
+              <a:buFont typeface="Arial" panose="020B0604020202020204" pitchFamily="34" charset="0"/>
+              <a:buChar char="•"/>
+              <a:defRPr sz="2400" kern="1200">
+                <a:solidFill>
+                  <a:schemeClr val="tx1"/>
+                </a:solidFill>
+                <a:latin typeface="+mn-lt"/>
+                <a:ea typeface="+mn-ea"/>
+                <a:cs typeface="+mn-cs"/>
+              </a:defRPr>
+            </a:lvl2pPr>
+            <a:lvl3pPr marL="1143000" indent="-228600" algn="l" defTabSz="914400" rtl="0" eaLnBrk="1" latinLnBrk="0" hangingPunct="1">
+              <a:lnSpc>
+                <a:spcPct val="90000"/>
+              </a:lnSpc>
+              <a:spcBef>
+                <a:spcPts val="500"/>
+              </a:spcBef>
+              <a:buFont typeface="Arial" panose="020B0604020202020204" pitchFamily="34" charset="0"/>
+              <a:buChar char="•"/>
+              <a:defRPr sz="2000" kern="1200">
+                <a:solidFill>
+                  <a:schemeClr val="tx1"/>
+                </a:solidFill>
+                <a:latin typeface="+mn-lt"/>
+                <a:ea typeface="+mn-ea"/>
+                <a:cs typeface="+mn-cs"/>
+              </a:defRPr>
+            </a:lvl3pPr>
+            <a:lvl4pPr marL="1600200" indent="-228600" algn="l" defTabSz="914400" rtl="0" eaLnBrk="1" latinLnBrk="0" hangingPunct="1">
+              <a:lnSpc>
+                <a:spcPct val="90000"/>
+              </a:lnSpc>
+              <a:spcBef>
+                <a:spcPts val="500"/>
+              </a:spcBef>
+              <a:buFont typeface="Arial" panose="020B0604020202020204" pitchFamily="34" charset="0"/>
+              <a:buChar char="•"/>
+              <a:defRPr sz="1800" kern="1200">
+                <a:solidFill>
+                  <a:schemeClr val="tx1"/>
+                </a:solidFill>
+                <a:latin typeface="+mn-lt"/>
+                <a:ea typeface="+mn-ea"/>
+                <a:cs typeface="+mn-cs"/>
+              </a:defRPr>
+            </a:lvl4pPr>
+            <a:lvl5pPr marL="2057400" indent="-228600" algn="l" defTabSz="914400" rtl="0" eaLnBrk="1" latinLnBrk="0" hangingPunct="1">
+              <a:lnSpc>
+                <a:spcPct val="90000"/>
+              </a:lnSpc>
+              <a:spcBef>
+                <a:spcPts val="500"/>
+              </a:spcBef>
+              <a:buFont typeface="Arial" panose="020B0604020202020204" pitchFamily="34" charset="0"/>
+              <a:buChar char="•"/>
+              <a:defRPr sz="1800" kern="1200">
+                <a:solidFill>
+                  <a:schemeClr val="tx1"/>
+                </a:solidFill>
+                <a:latin typeface="+mn-lt"/>
+                <a:ea typeface="+mn-ea"/>
+                <a:cs typeface="+mn-cs"/>
+              </a:defRPr>
+            </a:lvl5pPr>
+            <a:lvl6pPr marL="2514600" indent="-228600" algn="l" defTabSz="914400" rtl="0" eaLnBrk="1" latinLnBrk="0" hangingPunct="1">
+              <a:lnSpc>
+                <a:spcPct val="90000"/>
+              </a:lnSpc>
+              <a:spcBef>
+                <a:spcPts val="500"/>
+              </a:spcBef>
+              <a:buFont typeface="Arial" panose="020B0604020202020204" pitchFamily="34" charset="0"/>
+              <a:buChar char="•"/>
+              <a:defRPr sz="1800" kern="1200">
+                <a:solidFill>
+                  <a:schemeClr val="tx1"/>
+                </a:solidFill>
+                <a:latin typeface="+mn-lt"/>
+                <a:ea typeface="+mn-ea"/>
+                <a:cs typeface="+mn-cs"/>
+              </a:defRPr>
+            </a:lvl6pPr>
+            <a:lvl7pPr marL="2971800" indent="-228600" algn="l" defTabSz="914400" rtl="0" eaLnBrk="1" latinLnBrk="0" hangingPunct="1">
+              <a:lnSpc>
+                <a:spcPct val="90000"/>
+              </a:lnSpc>
+              <a:spcBef>
+                <a:spcPts val="500"/>
+              </a:spcBef>
+              <a:buFont typeface="Arial" panose="020B0604020202020204" pitchFamily="34" charset="0"/>
+              <a:buChar char="•"/>
+              <a:defRPr sz="1800" kern="1200">
+                <a:solidFill>
+                  <a:schemeClr val="tx1"/>
+                </a:solidFill>
+                <a:latin typeface="+mn-lt"/>
+                <a:ea typeface="+mn-ea"/>
+                <a:cs typeface="+mn-cs"/>
+              </a:defRPr>
+            </a:lvl7pPr>
+            <a:lvl8pPr marL="3429000" indent="-228600" algn="l" defTabSz="914400" rtl="0" eaLnBrk="1" latinLnBrk="0" hangingPunct="1">
+              <a:lnSpc>
+                <a:spcPct val="90000"/>
+              </a:lnSpc>
+              <a:spcBef>
+                <a:spcPts val="500"/>
+              </a:spcBef>
+              <a:buFont typeface="Arial" panose="020B0604020202020204" pitchFamily="34" charset="0"/>
+              <a:buChar char="•"/>
+              <a:defRPr sz="1800" kern="1200">
+                <a:solidFill>
+                  <a:schemeClr val="tx1"/>
+                </a:solidFill>
+                <a:latin typeface="+mn-lt"/>
+                <a:ea typeface="+mn-ea"/>
+                <a:cs typeface="+mn-cs"/>
+              </a:defRPr>
+            </a:lvl8pPr>
+            <a:lvl9pPr marL="3886200" indent="-228600" algn="l" defTabSz="914400" rtl="0" eaLnBrk="1" latinLnBrk="0" hangingPunct="1">
+              <a:lnSpc>
+                <a:spcPct val="90000"/>
+              </a:lnSpc>
+              <a:spcBef>
+                <a:spcPts val="500"/>
+              </a:spcBef>
+              <a:buFont typeface="Arial" panose="020B0604020202020204" pitchFamily="34" charset="0"/>
+              <a:buChar char="•"/>
+              <a:defRPr sz="1800" kern="1200">
+                <a:solidFill>
+                  <a:schemeClr val="tx1"/>
+                </a:solidFill>
+                <a:latin typeface="+mn-lt"/>
+                <a:ea typeface="+mn-ea"/>
+                <a:cs typeface="+mn-cs"/>
+              </a:defRPr>
+            </a:lvl9pPr>
+          </a:lstStyle>
+          <a:p>
+            <a:pPr marL="0" indent="0">
+              <a:buFont typeface="Arial" panose="020B0604020202020204" pitchFamily="34" charset="0"/>
+              <a:buNone/>
+            </a:pPr>
+            <a:r>
+              <a:rPr lang="en-US" sz="3200" dirty="0"/>
+              <a:t>The Python Way:</a:t>
             </a:r>
           </a:p>
         </p:txBody>
@@ -6660,7 +6537,7 @@
         <p:spPr>
           <a:xfrm>
             <a:off x="838200" y="1963126"/>
-            <a:ext cx="10515600" cy="3170099"/>
+            <a:ext cx="10515600" cy="2862322"/>
           </a:xfrm>
           <a:prstGeom prst="rect">
             <a:avLst/>
@@ -6680,279 +6557,289 @@
             <a:r>
               <a:rPr lang="en-US" sz="2000" dirty="0">
                 <a:solidFill>
-                  <a:srgbClr val="C586C0"/>
-                </a:solidFill>
-                <a:latin typeface="Consolas" panose="020B0609020204030204" pitchFamily="49" charset="0"/>
-              </a:rPr>
-              <a:t>try</a:t>
-            </a:r>
-            <a:r>
-              <a:rPr lang="en-US" sz="2000" dirty="0">
-                <a:solidFill>
-                  <a:srgbClr val="D4D4D4"/>
-                </a:solidFill>
-                <a:latin typeface="Consolas" panose="020B0609020204030204" pitchFamily="49" charset="0"/>
-              </a:rPr>
-              <a:t>:</a:t>
-            </a:r>
-          </a:p>
-          <a:p>
-            <a:r>
-              <a:rPr lang="en-US" sz="2000" dirty="0">
-                <a:solidFill>
-                  <a:srgbClr val="DCDCAA"/>
-                </a:solidFill>
-                <a:latin typeface="Consolas" panose="020B0609020204030204" pitchFamily="49" charset="0"/>
-              </a:rPr>
-              <a:t>	print</a:t>
-            </a:r>
-            <a:r>
-              <a:rPr lang="en-US" sz="2000" dirty="0">
-                <a:solidFill>
-                  <a:srgbClr val="D4D4D4"/>
-                </a:solidFill>
-                <a:latin typeface="Consolas" panose="020B0609020204030204" pitchFamily="49" charset="0"/>
+                  <a:srgbClr val="C687C1"/>
+                </a:solidFill>
+                <a:latin typeface="Menlo-Regular"/>
+              </a:rPr>
+              <a:t>try </a:t>
+            </a:r>
+            <a:r>
+              <a:rPr lang="en-US" sz="2000" dirty="0">
+                <a:solidFill>
+                  <a:srgbClr val="D5D5D5"/>
+                </a:solidFill>
+                <a:latin typeface="Menlo-Regular"/>
+              </a:rPr>
+              <a:t>{</a:t>
+            </a:r>
+          </a:p>
+          <a:p>
+            <a:r>
+              <a:rPr lang="en-US" sz="2000" dirty="0">
+                <a:solidFill>
+                  <a:srgbClr val="6A9A55"/>
+                </a:solidFill>
+                <a:latin typeface="Menlo-Regular"/>
+              </a:rPr>
+              <a:t>	// code block to try</a:t>
+            </a:r>
+          </a:p>
+          <a:p>
+            <a:r>
+              <a:rPr lang="en-US" sz="2000" dirty="0">
+                <a:solidFill>
+                  <a:srgbClr val="D5D5D5"/>
+                </a:solidFill>
+                <a:latin typeface="Menlo-Regular"/>
+              </a:rPr>
+              <a:t>}</a:t>
+            </a:r>
+          </a:p>
+          <a:p>
+            <a:r>
+              <a:rPr lang="en-US" sz="2000" dirty="0">
+                <a:solidFill>
+                  <a:srgbClr val="C687C1"/>
+                </a:solidFill>
+                <a:latin typeface="Menlo-Regular"/>
+              </a:rPr>
+              <a:t>catch </a:t>
+            </a:r>
+            <a:r>
+              <a:rPr lang="en-US" sz="2000" dirty="0">
+                <a:solidFill>
+                  <a:srgbClr val="D5D5D5"/>
+                </a:solidFill>
+                <a:latin typeface="Menlo-Regular"/>
               </a:rPr>
               <a:t>(</a:t>
             </a:r>
             <a:r>
-              <a:rPr lang="en-US" sz="2000" dirty="0">
-                <a:solidFill>
-                  <a:srgbClr val="B5CEA8"/>
-                </a:solidFill>
-                <a:latin typeface="Consolas" panose="020B0609020204030204" pitchFamily="49" charset="0"/>
-              </a:rPr>
-              <a:t>5</a:t>
-            </a:r>
-            <a:r>
-              <a:rPr lang="en-US" sz="2000" dirty="0">
-                <a:solidFill>
-                  <a:srgbClr val="D4D4D4"/>
-                </a:solidFill>
-                <a:latin typeface="Consolas" panose="020B0609020204030204" pitchFamily="49" charset="0"/>
-              </a:rPr>
-              <a:t>/</a:t>
-            </a:r>
-            <a:r>
-              <a:rPr lang="en-US" sz="2000" dirty="0">
-                <a:solidFill>
-                  <a:srgbClr val="B5CEA8"/>
-                </a:solidFill>
-                <a:latin typeface="Consolas" panose="020B0609020204030204" pitchFamily="49" charset="0"/>
-              </a:rPr>
-              <a:t>0</a:t>
-            </a:r>
-            <a:r>
-              <a:rPr lang="en-US" sz="2000" dirty="0">
-                <a:solidFill>
-                  <a:srgbClr val="D4D4D4"/>
-                </a:solidFill>
-                <a:latin typeface="Consolas" panose="020B0609020204030204" pitchFamily="49" charset="0"/>
-              </a:rPr>
-              <a:t>)</a:t>
-            </a:r>
-          </a:p>
-          <a:p>
-            <a:r>
-              <a:rPr lang="en-US" sz="2000" dirty="0">
-                <a:solidFill>
-                  <a:srgbClr val="C586C0"/>
-                </a:solidFill>
-                <a:latin typeface="Consolas" panose="020B0609020204030204" pitchFamily="49" charset="0"/>
-              </a:rPr>
-              <a:t>except</a:t>
-            </a:r>
-            <a:r>
-              <a:rPr lang="en-US" sz="2000" dirty="0">
-                <a:solidFill>
-                  <a:srgbClr val="D4D4D4"/>
-                </a:solidFill>
-                <a:latin typeface="Consolas" panose="020B0609020204030204" pitchFamily="49" charset="0"/>
+              <a:rPr lang="en-US" sz="2000" dirty="0" err="1">
+                <a:solidFill>
+                  <a:srgbClr val="D5D5D5"/>
+                </a:solidFill>
+                <a:latin typeface="Menlo-Regular"/>
+              </a:rPr>
+              <a:t>invalid_argument</a:t>
+            </a:r>
+            <a:r>
+              <a:rPr lang="en-US" sz="2000" dirty="0">
+                <a:solidFill>
+                  <a:srgbClr val="D5D5D5"/>
+                </a:solidFill>
+                <a:latin typeface="Menlo-Regular"/>
+              </a:rPr>
+              <a:t>&amp; ex) {</a:t>
+            </a:r>
+          </a:p>
+          <a:p>
+            <a:r>
+              <a:rPr lang="en-US" sz="2000" dirty="0">
+                <a:solidFill>
+                  <a:srgbClr val="D5D5D5"/>
+                </a:solidFill>
+                <a:latin typeface="Menlo-Regular"/>
+              </a:rPr>
+              <a:t>	</a:t>
+            </a:r>
+            <a:r>
+              <a:rPr lang="en-US" sz="2000" dirty="0" err="1">
+                <a:solidFill>
+                  <a:srgbClr val="D5D5D5"/>
+                </a:solidFill>
+                <a:latin typeface="Menlo-Regular"/>
+              </a:rPr>
+              <a:t>cout</a:t>
+            </a:r>
+            <a:r>
+              <a:rPr lang="en-US" sz="2000" dirty="0">
+                <a:solidFill>
+                  <a:srgbClr val="D5D5D5"/>
+                </a:solidFill>
+                <a:latin typeface="Menlo-Regular"/>
+              </a:rPr>
+              <a:t> &lt;&lt; </a:t>
+            </a:r>
+            <a:r>
+              <a:rPr lang="en-US" sz="2000" dirty="0">
+                <a:solidFill>
+                  <a:srgbClr val="CF9278"/>
+                </a:solidFill>
+                <a:latin typeface="Menlo-Regular"/>
+              </a:rPr>
+              <a:t>"An invalid-argument exception occurred: " </a:t>
+            </a:r>
+            <a:r>
+              <a:rPr lang="en-US" sz="2000" dirty="0">
+                <a:solidFill>
+                  <a:srgbClr val="D5D5D5"/>
+                </a:solidFill>
+                <a:latin typeface="Menlo-Regular"/>
+              </a:rPr>
+              <a:t>&lt;&lt; </a:t>
+            </a:r>
+            <a:r>
+              <a:rPr lang="en-US" sz="2000" dirty="0" err="1">
+                <a:solidFill>
+                  <a:srgbClr val="D5D5D5"/>
+                </a:solidFill>
+                <a:latin typeface="Menlo-Regular"/>
+              </a:rPr>
+              <a:t>ex.</a:t>
+            </a:r>
+            <a:r>
+              <a:rPr lang="en-US" sz="2000" dirty="0" err="1">
+                <a:solidFill>
+                  <a:srgbClr val="DDDDAB"/>
+                </a:solidFill>
+                <a:latin typeface="Menlo-Regular"/>
+              </a:rPr>
+              <a:t>what</a:t>
+            </a:r>
+            <a:r>
+              <a:rPr lang="en-US" sz="2000" dirty="0">
+                <a:solidFill>
+                  <a:srgbClr val="DDDDAB"/>
+                </a:solidFill>
+                <a:latin typeface="Menlo-Regular"/>
               </a:rPr>
               <a:t> </a:t>
             </a:r>
             <a:r>
+              <a:rPr lang="en-US" sz="2000" dirty="0">
+                <a:solidFill>
+                  <a:srgbClr val="D5D5D5"/>
+                </a:solidFill>
+                <a:latin typeface="Menlo-Regular"/>
+              </a:rPr>
+              <a:t>() &lt;&lt; </a:t>
+            </a:r>
+            <a:r>
               <a:rPr lang="en-US" sz="2000" dirty="0" err="1">
                 <a:solidFill>
-                  <a:srgbClr val="4EC9B0"/>
-                </a:solidFill>
-                <a:latin typeface="Consolas" panose="020B0609020204030204" pitchFamily="49" charset="0"/>
-              </a:rPr>
-              <a:t>ArithmeticError</a:t>
-            </a:r>
-            <a:r>
-              <a:rPr lang="en-US" sz="2000" dirty="0">
-                <a:solidFill>
-                  <a:srgbClr val="D4D4D4"/>
-                </a:solidFill>
-                <a:latin typeface="Consolas" panose="020B0609020204030204" pitchFamily="49" charset="0"/>
-              </a:rPr>
-              <a:t>:</a:t>
-            </a:r>
-          </a:p>
-          <a:p>
-            <a:r>
-              <a:rPr lang="en-US" sz="2000" dirty="0">
-                <a:solidFill>
-                  <a:srgbClr val="DCDCAA"/>
-                </a:solidFill>
-                <a:latin typeface="Consolas" panose="020B0609020204030204" pitchFamily="49" charset="0"/>
-              </a:rPr>
-              <a:t>	print</a:t>
-            </a:r>
-            <a:r>
-              <a:rPr lang="en-US" sz="2000" dirty="0">
-                <a:solidFill>
-                  <a:srgbClr val="D4D4D4"/>
-                </a:solidFill>
-                <a:latin typeface="Consolas" panose="020B0609020204030204" pitchFamily="49" charset="0"/>
-              </a:rPr>
-              <a:t>(</a:t>
-            </a:r>
-            <a:r>
-              <a:rPr lang="en-US" sz="2000" dirty="0">
-                <a:solidFill>
-                  <a:srgbClr val="CE9178"/>
-                </a:solidFill>
-                <a:latin typeface="Consolas" panose="020B0609020204030204" pitchFamily="49" charset="0"/>
-              </a:rPr>
-              <a:t>"You had an arithmetic error."</a:t>
-            </a:r>
-            <a:r>
-              <a:rPr lang="en-US" sz="2000" dirty="0">
-                <a:solidFill>
-                  <a:srgbClr val="D4D4D4"/>
-                </a:solidFill>
-                <a:latin typeface="Consolas" panose="020B0609020204030204" pitchFamily="49" charset="0"/>
-              </a:rPr>
-              <a:t>)</a:t>
-            </a:r>
-          </a:p>
-          <a:p>
-            <a:r>
-              <a:rPr lang="en-US" sz="2000" dirty="0">
-                <a:solidFill>
-                  <a:srgbClr val="C586C0"/>
-                </a:solidFill>
-                <a:latin typeface="Consolas" panose="020B0609020204030204" pitchFamily="49" charset="0"/>
-              </a:rPr>
-              <a:t>except</a:t>
-            </a:r>
-            <a:r>
-              <a:rPr lang="en-US" sz="2000" dirty="0">
-                <a:solidFill>
-                  <a:srgbClr val="D4D4D4"/>
-                </a:solidFill>
-                <a:latin typeface="Consolas" panose="020B0609020204030204" pitchFamily="49" charset="0"/>
-              </a:rPr>
-              <a:t>:</a:t>
-            </a:r>
-          </a:p>
-          <a:p>
-            <a:r>
-              <a:rPr lang="en-US" sz="2000" dirty="0">
-                <a:solidFill>
-                  <a:srgbClr val="DCDCAA"/>
-                </a:solidFill>
-                <a:latin typeface="Consolas" panose="020B0609020204030204" pitchFamily="49" charset="0"/>
-              </a:rPr>
-              <a:t>	print</a:t>
-            </a:r>
-            <a:r>
-              <a:rPr lang="en-US" sz="2000" dirty="0">
-                <a:solidFill>
-                  <a:srgbClr val="D4D4D4"/>
-                </a:solidFill>
-                <a:latin typeface="Consolas" panose="020B0609020204030204" pitchFamily="49" charset="0"/>
-              </a:rPr>
-              <a:t>(</a:t>
-            </a:r>
-            <a:r>
-              <a:rPr lang="en-US" sz="2000" dirty="0">
-                <a:solidFill>
-                  <a:srgbClr val="CE9178"/>
-                </a:solidFill>
-                <a:latin typeface="Consolas" panose="020B0609020204030204" pitchFamily="49" charset="0"/>
-              </a:rPr>
-              <a:t>"You cannot do that!"</a:t>
-            </a:r>
-            <a:r>
-              <a:rPr lang="en-US" sz="2000" dirty="0">
-                <a:solidFill>
-                  <a:srgbClr val="D4D4D4"/>
-                </a:solidFill>
-                <a:latin typeface="Consolas" panose="020B0609020204030204" pitchFamily="49" charset="0"/>
-              </a:rPr>
-              <a:t>)</a:t>
-            </a:r>
-          </a:p>
-          <a:p>
-            <a:r>
-              <a:rPr lang="en-US" sz="2000" dirty="0">
-                <a:solidFill>
-                  <a:srgbClr val="C586C0"/>
-                </a:solidFill>
-                <a:latin typeface="Consolas" panose="020B0609020204030204" pitchFamily="49" charset="0"/>
-              </a:rPr>
-              <a:t>else</a:t>
-            </a:r>
-            <a:r>
-              <a:rPr lang="en-US" sz="2000" dirty="0">
-                <a:solidFill>
-                  <a:srgbClr val="D4D4D4"/>
-                </a:solidFill>
-                <a:latin typeface="Consolas" panose="020B0609020204030204" pitchFamily="49" charset="0"/>
-              </a:rPr>
-              <a:t>:</a:t>
-            </a:r>
-          </a:p>
-          <a:p>
-            <a:r>
-              <a:rPr lang="en-US" sz="2000" dirty="0">
-                <a:solidFill>
-                  <a:srgbClr val="DCDCAA"/>
-                </a:solidFill>
-                <a:latin typeface="Consolas" panose="020B0609020204030204" pitchFamily="49" charset="0"/>
-              </a:rPr>
-              <a:t>	print</a:t>
-            </a:r>
-            <a:r>
-              <a:rPr lang="en-US" sz="2000" dirty="0">
-                <a:solidFill>
-                  <a:srgbClr val="D4D4D4"/>
-                </a:solidFill>
-                <a:latin typeface="Consolas" panose="020B0609020204030204" pitchFamily="49" charset="0"/>
-              </a:rPr>
-              <a:t>(</a:t>
-            </a:r>
-            <a:r>
-              <a:rPr lang="en-US" sz="2000" dirty="0">
-                <a:solidFill>
-                  <a:srgbClr val="CE9178"/>
-                </a:solidFill>
-                <a:latin typeface="Consolas" panose="020B0609020204030204" pitchFamily="49" charset="0"/>
-              </a:rPr>
-              <a:t>"No errors."</a:t>
-            </a:r>
-            <a:r>
-              <a:rPr lang="en-US" sz="2000" dirty="0">
-                <a:solidFill>
-                  <a:srgbClr val="D4D4D4"/>
-                </a:solidFill>
-                <a:latin typeface="Consolas" panose="020B0609020204030204" pitchFamily="49" charset="0"/>
-              </a:rPr>
-              <a:t>)</a:t>
-            </a:r>
-          </a:p>
-          <a:p>
-            <a:endParaRPr lang="en-US" sz="2000" dirty="0">
-              <a:solidFill>
-                <a:srgbClr val="D4D4D4"/>
-              </a:solidFill>
-              <a:latin typeface="Consolas" panose="020B0609020204030204" pitchFamily="49" charset="0"/>
-            </a:endParaRPr>
-          </a:p>
-          <a:p>
+                  <a:srgbClr val="D5D5D5"/>
+                </a:solidFill>
+                <a:latin typeface="Menlo-Regular"/>
+              </a:rPr>
+              <a:t>endl</a:t>
+            </a:r>
+            <a:r>
+              <a:rPr lang="en-US" sz="2000" dirty="0">
+                <a:solidFill>
+                  <a:srgbClr val="D5D5D5"/>
+                </a:solidFill>
+                <a:latin typeface="Menlo-Regular"/>
+              </a:rPr>
+              <a:t>;</a:t>
+            </a:r>
+          </a:p>
+          <a:p>
+            <a:r>
+              <a:rPr lang="en-US" sz="2000" dirty="0">
+                <a:solidFill>
+                  <a:srgbClr val="D5D5D5"/>
+                </a:solidFill>
+                <a:latin typeface="Menlo-Regular"/>
+              </a:rPr>
+              <a:t>}</a:t>
+            </a:r>
+          </a:p>
+          <a:p>
+            <a:r>
+              <a:rPr lang="en-US" sz="2000" dirty="0">
+                <a:solidFill>
+                  <a:srgbClr val="C687C1"/>
+                </a:solidFill>
+                <a:latin typeface="Menlo-Regular"/>
+              </a:rPr>
+              <a:t>catch </a:t>
+            </a:r>
+            <a:r>
+              <a:rPr lang="en-US" sz="2000" dirty="0">
+                <a:solidFill>
+                  <a:srgbClr val="D5D5D5"/>
+                </a:solidFill>
+                <a:latin typeface="Menlo-Regular"/>
+              </a:rPr>
+              <a:t>(...) {</a:t>
+            </a:r>
+          </a:p>
+          <a:p>
+            <a:r>
+              <a:rPr lang="en-US" sz="2000" dirty="0">
+                <a:solidFill>
+                  <a:srgbClr val="D5D5D5"/>
+                </a:solidFill>
+                <a:latin typeface="Menlo-Regular"/>
+              </a:rPr>
+              <a:t>	</a:t>
+            </a:r>
+            <a:r>
+              <a:rPr lang="en-US" sz="2000" dirty="0" err="1">
+                <a:solidFill>
+                  <a:srgbClr val="D5D5D5"/>
+                </a:solidFill>
+                <a:latin typeface="Menlo-Regular"/>
+              </a:rPr>
+              <a:t>cout</a:t>
+            </a:r>
+            <a:r>
+              <a:rPr lang="en-US" sz="2000" dirty="0">
+                <a:solidFill>
+                  <a:srgbClr val="D5D5D5"/>
+                </a:solidFill>
+                <a:latin typeface="Menlo-Regular"/>
+              </a:rPr>
+              <a:t> &lt;&lt; </a:t>
+            </a:r>
+            <a:r>
+              <a:rPr lang="en-US" sz="2000" dirty="0">
+                <a:solidFill>
+                  <a:srgbClr val="CF9278"/>
+                </a:solidFill>
+                <a:latin typeface="Menlo-Regular"/>
+              </a:rPr>
+              <a:t>"Something besides an invalid-argument exception occurred" </a:t>
+            </a:r>
+            <a:r>
+              <a:rPr lang="en-US" sz="2000" dirty="0">
+                <a:solidFill>
+                  <a:srgbClr val="D5D5D5"/>
+                </a:solidFill>
+                <a:latin typeface="Menlo-Regular"/>
+              </a:rPr>
+              <a:t>&lt;&lt; </a:t>
+            </a:r>
+            <a:r>
+              <a:rPr lang="en-US" sz="2000" dirty="0" err="1">
+                <a:solidFill>
+                  <a:srgbClr val="D5D5D5"/>
+                </a:solidFill>
+                <a:latin typeface="Menlo-Regular"/>
+              </a:rPr>
+              <a:t>endl</a:t>
+            </a:r>
+            <a:r>
+              <a:rPr lang="en-US" sz="2000" dirty="0">
+                <a:solidFill>
+                  <a:srgbClr val="D5D5D5"/>
+                </a:solidFill>
+                <a:latin typeface="Menlo-Regular"/>
+              </a:rPr>
+              <a:t>;</a:t>
+            </a:r>
+          </a:p>
+          <a:p>
+            <a:r>
+              <a:rPr lang="en-US" sz="2000" dirty="0">
+                <a:solidFill>
+                  <a:srgbClr val="D5D5D5"/>
+                </a:solidFill>
+                <a:latin typeface="Menlo-Regular"/>
+              </a:rPr>
+              <a:t>}</a:t>
+            </a:r>
             <a:endParaRPr lang="en-US" sz="2000" b="0" dirty="0">
               <a:solidFill>
                 <a:srgbClr val="D4D4D4"/>
@@ -6967,7 +6854,7 @@
     </p:spTree>
     <p:extLst>
       <p:ext uri="{BB962C8B-B14F-4D97-AF65-F5344CB8AC3E}">
-        <p14:creationId xmlns:p14="http://schemas.microsoft.com/office/powerpoint/2010/main" val="154054992"/>
+        <p14:creationId xmlns:p14="http://schemas.microsoft.com/office/powerpoint/2010/main" val="4222260773"/>
       </p:ext>
     </p:extLst>
   </p:cSld>
@@ -6999,7 +6886,7 @@
           <p:cNvPr id="2" name="Title 1">
             <a:extLst>
               <a:ext uri="{FF2B5EF4-FFF2-40B4-BE49-F238E27FC236}">
-                <a16:creationId xmlns:a16="http://schemas.microsoft.com/office/drawing/2014/main" id="{261C0A93-96AA-44E0-B3D6-FF0275AF9274}"/>
+                <a16:creationId xmlns:a16="http://schemas.microsoft.com/office/drawing/2014/main" id="{8F3C2353-D7C4-4040-916A-0527F43EAEE9}"/>
               </a:ext>
             </a:extLst>
           </p:cNvPr>
@@ -7007,7 +6894,7 @@
             <a:spLocks noGrp="1"/>
           </p:cNvSpPr>
           <p:nvPr>
-            <p:ph type="ctrTitle"/>
+            <p:ph type="title"/>
           </p:nvPr>
         </p:nvSpPr>
         <p:spPr/>
@@ -7017,40 +6904,334 @@
           <a:p>
             <a:r>
               <a:rPr lang="en-US" dirty="0"/>
-              <a:t>Debugging</a:t>
+              <a:t>Python</a:t>
             </a:r>
           </a:p>
         </p:txBody>
       </p:sp>
       <p:sp>
         <p:nvSpPr>
-          <p:cNvPr id="3" name="Subtitle 2">
-            <a:extLst>
-              <a:ext uri="{FF2B5EF4-FFF2-40B4-BE49-F238E27FC236}">
-                <a16:creationId xmlns:a16="http://schemas.microsoft.com/office/drawing/2014/main" id="{B2892487-6D5E-41D3-98F0-29EC71A8422C}"/>
-              </a:ext>
-            </a:extLst>
-          </p:cNvPr>
-          <p:cNvSpPr>
-            <a:spLocks noGrp="1"/>
-          </p:cNvSpPr>
-          <p:nvPr>
-            <p:ph type="subTitle" idx="1"/>
-          </p:nvPr>
+          <p:cNvPr id="8" name="Rectangle 7">
+            <a:extLst>
+              <a:ext uri="{FF2B5EF4-FFF2-40B4-BE49-F238E27FC236}">
+                <a16:creationId xmlns:a16="http://schemas.microsoft.com/office/drawing/2014/main" id="{73BB6F64-CFD0-B249-BAC1-2682FF06EB4E}"/>
+              </a:ext>
+            </a:extLst>
+          </p:cNvPr>
+          <p:cNvSpPr/>
+          <p:nvPr/>
         </p:nvSpPr>
-        <p:spPr/>
+        <p:spPr>
+          <a:xfrm>
+            <a:off x="838200" y="1963126"/>
+            <a:ext cx="10515600" cy="3170099"/>
+          </a:xfrm>
+          <a:prstGeom prst="rect">
+            <a:avLst/>
+          </a:prstGeom>
+          <a:solidFill>
+            <a:schemeClr val="bg2">
+              <a:lumMod val="25000"/>
+            </a:schemeClr>
+          </a:solidFill>
+        </p:spPr>
         <p:txBody>
-          <a:bodyPr/>
+          <a:bodyPr wrap="square">
+            <a:spAutoFit/>
+          </a:bodyPr>
           <a:lstStyle/>
           <a:p>
-            <a:endParaRPr lang="en-US" dirty="0"/>
+            <a:r>
+              <a:rPr lang="en-US" sz="2000" dirty="0">
+                <a:solidFill>
+                  <a:srgbClr val="C586C0"/>
+                </a:solidFill>
+                <a:latin typeface="Consolas" panose="020B0609020204030204" pitchFamily="49" charset="0"/>
+              </a:rPr>
+              <a:t>try</a:t>
+            </a:r>
+            <a:r>
+              <a:rPr lang="en-US" sz="2000" dirty="0">
+                <a:solidFill>
+                  <a:srgbClr val="D4D4D4"/>
+                </a:solidFill>
+                <a:latin typeface="Consolas" panose="020B0609020204030204" pitchFamily="49" charset="0"/>
+              </a:rPr>
+              <a:t>:</a:t>
+            </a:r>
+          </a:p>
+          <a:p>
+            <a:r>
+              <a:rPr lang="en-US" sz="2000" dirty="0">
+                <a:solidFill>
+                  <a:srgbClr val="DCDCAA"/>
+                </a:solidFill>
+                <a:latin typeface="Consolas" panose="020B0609020204030204" pitchFamily="49" charset="0"/>
+              </a:rPr>
+              <a:t>	print</a:t>
+            </a:r>
+            <a:r>
+              <a:rPr lang="en-US" sz="2000" dirty="0">
+                <a:solidFill>
+                  <a:srgbClr val="D4D4D4"/>
+                </a:solidFill>
+                <a:latin typeface="Consolas" panose="020B0609020204030204" pitchFamily="49" charset="0"/>
+              </a:rPr>
+              <a:t>(</a:t>
+            </a:r>
+            <a:r>
+              <a:rPr lang="en-US" sz="2000" dirty="0">
+                <a:solidFill>
+                  <a:srgbClr val="B5CEA8"/>
+                </a:solidFill>
+                <a:latin typeface="Consolas" panose="020B0609020204030204" pitchFamily="49" charset="0"/>
+              </a:rPr>
+              <a:t>5</a:t>
+            </a:r>
+            <a:r>
+              <a:rPr lang="en-US" sz="2000" dirty="0">
+                <a:solidFill>
+                  <a:srgbClr val="D4D4D4"/>
+                </a:solidFill>
+                <a:latin typeface="Consolas" panose="020B0609020204030204" pitchFamily="49" charset="0"/>
+              </a:rPr>
+              <a:t>/</a:t>
+            </a:r>
+            <a:r>
+              <a:rPr lang="en-US" sz="2000" dirty="0">
+                <a:solidFill>
+                  <a:srgbClr val="B5CEA8"/>
+                </a:solidFill>
+                <a:latin typeface="Consolas" panose="020B0609020204030204" pitchFamily="49" charset="0"/>
+              </a:rPr>
+              <a:t>0</a:t>
+            </a:r>
+            <a:r>
+              <a:rPr lang="en-US" sz="2000" dirty="0">
+                <a:solidFill>
+                  <a:srgbClr val="D4D4D4"/>
+                </a:solidFill>
+                <a:latin typeface="Consolas" panose="020B0609020204030204" pitchFamily="49" charset="0"/>
+              </a:rPr>
+              <a:t>)</a:t>
+            </a:r>
+          </a:p>
+          <a:p>
+            <a:r>
+              <a:rPr lang="en-US" sz="2000" dirty="0">
+                <a:solidFill>
+                  <a:srgbClr val="C586C0"/>
+                </a:solidFill>
+                <a:latin typeface="Consolas" panose="020B0609020204030204" pitchFamily="49" charset="0"/>
+              </a:rPr>
+              <a:t>except</a:t>
+            </a:r>
+            <a:r>
+              <a:rPr lang="en-US" sz="2000" dirty="0">
+                <a:solidFill>
+                  <a:srgbClr val="D4D4D4"/>
+                </a:solidFill>
+                <a:latin typeface="Consolas" panose="020B0609020204030204" pitchFamily="49" charset="0"/>
+              </a:rPr>
+              <a:t> </a:t>
+            </a:r>
+            <a:r>
+              <a:rPr lang="en-US" sz="2000" dirty="0" err="1">
+                <a:solidFill>
+                  <a:srgbClr val="4EC9B0"/>
+                </a:solidFill>
+                <a:latin typeface="Consolas" panose="020B0609020204030204" pitchFamily="49" charset="0"/>
+              </a:rPr>
+              <a:t>ArithmeticError</a:t>
+            </a:r>
+            <a:r>
+              <a:rPr lang="en-US" sz="2000" dirty="0">
+                <a:solidFill>
+                  <a:srgbClr val="D4D4D4"/>
+                </a:solidFill>
+                <a:latin typeface="Consolas" panose="020B0609020204030204" pitchFamily="49" charset="0"/>
+              </a:rPr>
+              <a:t>:</a:t>
+            </a:r>
+          </a:p>
+          <a:p>
+            <a:r>
+              <a:rPr lang="en-US" sz="2000" dirty="0">
+                <a:solidFill>
+                  <a:srgbClr val="DCDCAA"/>
+                </a:solidFill>
+                <a:latin typeface="Consolas" panose="020B0609020204030204" pitchFamily="49" charset="0"/>
+              </a:rPr>
+              <a:t>	print</a:t>
+            </a:r>
+            <a:r>
+              <a:rPr lang="en-US" sz="2000" dirty="0">
+                <a:solidFill>
+                  <a:srgbClr val="D4D4D4"/>
+                </a:solidFill>
+                <a:latin typeface="Consolas" panose="020B0609020204030204" pitchFamily="49" charset="0"/>
+              </a:rPr>
+              <a:t>(</a:t>
+            </a:r>
+            <a:r>
+              <a:rPr lang="en-US" sz="2000" dirty="0">
+                <a:solidFill>
+                  <a:srgbClr val="CE9178"/>
+                </a:solidFill>
+                <a:latin typeface="Consolas" panose="020B0609020204030204" pitchFamily="49" charset="0"/>
+              </a:rPr>
+              <a:t>"You had an arithmetic error."</a:t>
+            </a:r>
+            <a:r>
+              <a:rPr lang="en-US" sz="2000" dirty="0">
+                <a:solidFill>
+                  <a:srgbClr val="D4D4D4"/>
+                </a:solidFill>
+                <a:latin typeface="Consolas" panose="020B0609020204030204" pitchFamily="49" charset="0"/>
+              </a:rPr>
+              <a:t>)</a:t>
+            </a:r>
+          </a:p>
+          <a:p>
+            <a:r>
+              <a:rPr lang="en-US" sz="2000" dirty="0">
+                <a:solidFill>
+                  <a:srgbClr val="C586C0"/>
+                </a:solidFill>
+                <a:latin typeface="Consolas" panose="020B0609020204030204" pitchFamily="49" charset="0"/>
+              </a:rPr>
+              <a:t>except</a:t>
+            </a:r>
+            <a:r>
+              <a:rPr lang="en-US" sz="2000" dirty="0">
+                <a:solidFill>
+                  <a:srgbClr val="D4D4D4"/>
+                </a:solidFill>
+                <a:latin typeface="Consolas" panose="020B0609020204030204" pitchFamily="49" charset="0"/>
+              </a:rPr>
+              <a:t>:</a:t>
+            </a:r>
+          </a:p>
+          <a:p>
+            <a:r>
+              <a:rPr lang="en-US" sz="2000" dirty="0">
+                <a:solidFill>
+                  <a:srgbClr val="DCDCAA"/>
+                </a:solidFill>
+                <a:latin typeface="Consolas" panose="020B0609020204030204" pitchFamily="49" charset="0"/>
+              </a:rPr>
+              <a:t>	print</a:t>
+            </a:r>
+            <a:r>
+              <a:rPr lang="en-US" sz="2000" dirty="0">
+                <a:solidFill>
+                  <a:srgbClr val="D4D4D4"/>
+                </a:solidFill>
+                <a:latin typeface="Consolas" panose="020B0609020204030204" pitchFamily="49" charset="0"/>
+              </a:rPr>
+              <a:t>(</a:t>
+            </a:r>
+            <a:r>
+              <a:rPr lang="en-US" sz="2000" dirty="0">
+                <a:solidFill>
+                  <a:srgbClr val="CE9178"/>
+                </a:solidFill>
+                <a:latin typeface="Consolas" panose="020B0609020204030204" pitchFamily="49" charset="0"/>
+              </a:rPr>
+              <a:t>"You cannot do that!"</a:t>
+            </a:r>
+            <a:r>
+              <a:rPr lang="en-US" sz="2000" dirty="0">
+                <a:solidFill>
+                  <a:srgbClr val="D4D4D4"/>
+                </a:solidFill>
+                <a:latin typeface="Consolas" panose="020B0609020204030204" pitchFamily="49" charset="0"/>
+              </a:rPr>
+              <a:t>)</a:t>
+            </a:r>
+          </a:p>
+          <a:p>
+            <a:r>
+              <a:rPr lang="en-US" sz="2000" dirty="0">
+                <a:solidFill>
+                  <a:srgbClr val="C586C0"/>
+                </a:solidFill>
+                <a:latin typeface="Consolas" panose="020B0609020204030204" pitchFamily="49" charset="0"/>
+              </a:rPr>
+              <a:t>else</a:t>
+            </a:r>
+            <a:r>
+              <a:rPr lang="en-US" sz="2000" dirty="0">
+                <a:solidFill>
+                  <a:srgbClr val="D4D4D4"/>
+                </a:solidFill>
+                <a:latin typeface="Consolas" panose="020B0609020204030204" pitchFamily="49" charset="0"/>
+              </a:rPr>
+              <a:t>:</a:t>
+            </a:r>
+          </a:p>
+          <a:p>
+            <a:r>
+              <a:rPr lang="en-US" sz="2000" dirty="0">
+                <a:solidFill>
+                  <a:srgbClr val="DCDCAA"/>
+                </a:solidFill>
+                <a:latin typeface="Consolas" panose="020B0609020204030204" pitchFamily="49" charset="0"/>
+              </a:rPr>
+              <a:t>	print</a:t>
+            </a:r>
+            <a:r>
+              <a:rPr lang="en-US" sz="2000" dirty="0">
+                <a:solidFill>
+                  <a:srgbClr val="D4D4D4"/>
+                </a:solidFill>
+                <a:latin typeface="Consolas" panose="020B0609020204030204" pitchFamily="49" charset="0"/>
+              </a:rPr>
+              <a:t>(</a:t>
+            </a:r>
+            <a:r>
+              <a:rPr lang="en-US" sz="2000" dirty="0">
+                <a:solidFill>
+                  <a:srgbClr val="CE9178"/>
+                </a:solidFill>
+                <a:latin typeface="Consolas" panose="020B0609020204030204" pitchFamily="49" charset="0"/>
+              </a:rPr>
+              <a:t>"No errors."</a:t>
+            </a:r>
+            <a:r>
+              <a:rPr lang="en-US" sz="2000" dirty="0">
+                <a:solidFill>
+                  <a:srgbClr val="D4D4D4"/>
+                </a:solidFill>
+                <a:latin typeface="Consolas" panose="020B0609020204030204" pitchFamily="49" charset="0"/>
+              </a:rPr>
+              <a:t>)</a:t>
+            </a:r>
+          </a:p>
+          <a:p>
+            <a:endParaRPr lang="en-US" sz="2000" dirty="0">
+              <a:solidFill>
+                <a:srgbClr val="D4D4D4"/>
+              </a:solidFill>
+              <a:latin typeface="Consolas" panose="020B0609020204030204" pitchFamily="49" charset="0"/>
+            </a:endParaRPr>
+          </a:p>
+          <a:p>
+            <a:endParaRPr lang="en-US" sz="2000" b="0" dirty="0">
+              <a:solidFill>
+                <a:srgbClr val="D4D4D4"/>
+              </a:solidFill>
+              <a:effectLst/>
+              <a:latin typeface="Courier New" panose="02070309020205020404" pitchFamily="49" charset="0"/>
+              <a:cs typeface="Courier New" panose="02070309020205020404" pitchFamily="49" charset="0"/>
+            </a:endParaRPr>
           </a:p>
         </p:txBody>
       </p:sp>
     </p:spTree>
     <p:extLst>
       <p:ext uri="{BB962C8B-B14F-4D97-AF65-F5344CB8AC3E}">
-        <p14:creationId xmlns:p14="http://schemas.microsoft.com/office/powerpoint/2010/main" val="3649766771"/>
+        <p14:creationId xmlns:p14="http://schemas.microsoft.com/office/powerpoint/2010/main" val="154054992"/>
       </p:ext>
     </p:extLst>
   </p:cSld>
@@ -7077,46 +7258,63 @@
           <a:chExt cx="0" cy="0"/>
         </a:xfrm>
       </p:grpSpPr>
-      <p:pic>
-        <p:nvPicPr>
-          <p:cNvPr id="3" name="Picture 2">
-            <a:extLst>
-              <a:ext uri="{FF2B5EF4-FFF2-40B4-BE49-F238E27FC236}">
-                <a16:creationId xmlns:a16="http://schemas.microsoft.com/office/drawing/2014/main" id="{396E7357-4879-4BD0-B902-6C75F6B5C9C0}"/>
-              </a:ext>
-            </a:extLst>
-          </p:cNvPr>
-          <p:cNvPicPr>
-            <a:picLocks noChangeAspect="1"/>
-          </p:cNvPicPr>
-          <p:nvPr/>
-        </p:nvPicPr>
-        <p:blipFill>
-          <a:blip r:embed="rId2">
-            <a:extLst>
-              <a:ext uri="{28A0092B-C50C-407E-A947-70E740481C1C}">
-                <a14:useLocalDpi xmlns:a14="http://schemas.microsoft.com/office/drawing/2010/main" val="0"/>
-              </a:ext>
-            </a:extLst>
-          </a:blip>
-          <a:stretch>
-            <a:fillRect/>
-          </a:stretch>
-        </p:blipFill>
-        <p:spPr>
-          <a:xfrm>
-            <a:off x="2524235" y="1128783"/>
-            <a:ext cx="7143529" cy="4600433"/>
-          </a:xfrm>
-          <a:prstGeom prst="rect">
-            <a:avLst/>
-          </a:prstGeom>
-        </p:spPr>
-      </p:pic>
+      <p:sp>
+        <p:nvSpPr>
+          <p:cNvPr id="2" name="Title 1">
+            <a:extLst>
+              <a:ext uri="{FF2B5EF4-FFF2-40B4-BE49-F238E27FC236}">
+                <a16:creationId xmlns:a16="http://schemas.microsoft.com/office/drawing/2014/main" id="{261C0A93-96AA-44E0-B3D6-FF0275AF9274}"/>
+              </a:ext>
+            </a:extLst>
+          </p:cNvPr>
+          <p:cNvSpPr>
+            <a:spLocks noGrp="1"/>
+          </p:cNvSpPr>
+          <p:nvPr>
+            <p:ph type="ctrTitle"/>
+          </p:nvPr>
+        </p:nvSpPr>
+        <p:spPr/>
+        <p:txBody>
+          <a:bodyPr/>
+          <a:lstStyle/>
+          <a:p>
+            <a:r>
+              <a:rPr lang="en-US" dirty="0"/>
+              <a:t>Debugging</a:t>
+            </a:r>
+          </a:p>
+        </p:txBody>
+      </p:sp>
+      <p:sp>
+        <p:nvSpPr>
+          <p:cNvPr id="3" name="Subtitle 2">
+            <a:extLst>
+              <a:ext uri="{FF2B5EF4-FFF2-40B4-BE49-F238E27FC236}">
+                <a16:creationId xmlns:a16="http://schemas.microsoft.com/office/drawing/2014/main" id="{B2892487-6D5E-41D3-98F0-29EC71A8422C}"/>
+              </a:ext>
+            </a:extLst>
+          </p:cNvPr>
+          <p:cNvSpPr>
+            <a:spLocks noGrp="1"/>
+          </p:cNvSpPr>
+          <p:nvPr>
+            <p:ph type="subTitle" idx="1"/>
+          </p:nvPr>
+        </p:nvSpPr>
+        <p:spPr/>
+        <p:txBody>
+          <a:bodyPr/>
+          <a:lstStyle/>
+          <a:p>
+            <a:endParaRPr lang="en-US" dirty="0"/>
+          </a:p>
+        </p:txBody>
+      </p:sp>
     </p:spTree>
     <p:extLst>
       <p:ext uri="{BB962C8B-B14F-4D97-AF65-F5344CB8AC3E}">
-        <p14:creationId xmlns:p14="http://schemas.microsoft.com/office/powerpoint/2010/main" val="1895715889"/>
+        <p14:creationId xmlns:p14="http://schemas.microsoft.com/office/powerpoint/2010/main" val="3649766771"/>
       </p:ext>
     </p:extLst>
   </p:cSld>
@@ -7171,8 +7369,8 @@
         </p:blipFill>
         <p:spPr>
           <a:xfrm>
-            <a:off x="2712561" y="1263599"/>
-            <a:ext cx="6766877" cy="4330802"/>
+            <a:off x="2524235" y="1128783"/>
+            <a:ext cx="7143529" cy="4600433"/>
           </a:xfrm>
           <a:prstGeom prst="rect">
             <a:avLst/>
@@ -7182,7 +7380,7 @@
     </p:spTree>
     <p:extLst>
       <p:ext uri="{BB962C8B-B14F-4D97-AF65-F5344CB8AC3E}">
-        <p14:creationId xmlns:p14="http://schemas.microsoft.com/office/powerpoint/2010/main" val="3429992489"/>
+        <p14:creationId xmlns:p14="http://schemas.microsoft.com/office/powerpoint/2010/main" val="1895715889"/>
       </p:ext>
     </p:extLst>
   </p:cSld>
@@ -7209,60 +7407,36 @@
           <a:chExt cx="0" cy="0"/>
         </a:xfrm>
       </p:grpSpPr>
-      <p:sp>
-        <p:nvSpPr>
-          <p:cNvPr id="2" name="Title 1">
-            <a:extLst>
-              <a:ext uri="{FF2B5EF4-FFF2-40B4-BE49-F238E27FC236}">
-                <a16:creationId xmlns:a16="http://schemas.microsoft.com/office/drawing/2014/main" id="{8F3C2353-D7C4-4040-916A-0527F43EAEE9}"/>
-              </a:ext>
-            </a:extLst>
-          </p:cNvPr>
-          <p:cNvSpPr>
-            <a:spLocks noGrp="1"/>
-          </p:cNvSpPr>
-          <p:nvPr>
-            <p:ph type="title"/>
-          </p:nvPr>
-        </p:nvSpPr>
-        <p:spPr/>
-        <p:txBody>
-          <a:bodyPr/>
-          <a:lstStyle/>
-          <a:p>
-            <a:r>
-              <a:rPr lang="en-US" dirty="0"/>
-              <a:t>Visual Studio Code Debugger</a:t>
-            </a:r>
-          </a:p>
-        </p:txBody>
-      </p:sp>
       <p:pic>
         <p:nvPicPr>
-          <p:cNvPr id="5" name="Content Placeholder 4">
-            <a:extLst>
-              <a:ext uri="{FF2B5EF4-FFF2-40B4-BE49-F238E27FC236}">
-                <a16:creationId xmlns:a16="http://schemas.microsoft.com/office/drawing/2014/main" id="{545CE961-007F-4A3E-A3EA-DB15BEA7E7F6}"/>
+          <p:cNvPr id="3" name="Picture 2">
+            <a:extLst>
+              <a:ext uri="{FF2B5EF4-FFF2-40B4-BE49-F238E27FC236}">
+                <a16:creationId xmlns:a16="http://schemas.microsoft.com/office/drawing/2014/main" id="{396E7357-4879-4BD0-B902-6C75F6B5C9C0}"/>
               </a:ext>
             </a:extLst>
           </p:cNvPr>
           <p:cNvPicPr>
-            <a:picLocks noGrp="1" noChangeAspect="1"/>
+            <a:picLocks noChangeAspect="1"/>
           </p:cNvPicPr>
-          <p:nvPr>
-            <p:ph idx="1"/>
-          </p:nvPr>
+          <p:nvPr/>
         </p:nvPicPr>
         <p:blipFill>
-          <a:blip r:embed="rId2"/>
+          <a:blip r:embed="rId2">
+            <a:extLst>
+              <a:ext uri="{28A0092B-C50C-407E-A947-70E740481C1C}">
+                <a14:useLocalDpi xmlns:a14="http://schemas.microsoft.com/office/drawing/2010/main" val="0"/>
+              </a:ext>
+            </a:extLst>
+          </a:blip>
           <a:stretch>
             <a:fillRect/>
           </a:stretch>
         </p:blipFill>
         <p:spPr>
           <a:xfrm>
-            <a:off x="2056836" y="2872424"/>
-            <a:ext cx="8078327" cy="2257740"/>
+            <a:off x="2712561" y="1263599"/>
+            <a:ext cx="6766877" cy="4330802"/>
           </a:xfrm>
           <a:prstGeom prst="rect">
             <a:avLst/>
@@ -7272,7 +7446,7 @@
     </p:spTree>
     <p:extLst>
       <p:ext uri="{BB962C8B-B14F-4D97-AF65-F5344CB8AC3E}">
-        <p14:creationId xmlns:p14="http://schemas.microsoft.com/office/powerpoint/2010/main" val="1583151527"/>
+        <p14:creationId xmlns:p14="http://schemas.microsoft.com/office/powerpoint/2010/main" val="3429992489"/>
       </p:ext>
     </p:extLst>
   </p:cSld>
@@ -7299,12 +7473,40 @@
           <a:chExt cx="0" cy="0"/>
         </a:xfrm>
       </p:grpSpPr>
+      <p:sp>
+        <p:nvSpPr>
+          <p:cNvPr id="2" name="Title 1">
+            <a:extLst>
+              <a:ext uri="{FF2B5EF4-FFF2-40B4-BE49-F238E27FC236}">
+                <a16:creationId xmlns:a16="http://schemas.microsoft.com/office/drawing/2014/main" id="{8F3C2353-D7C4-4040-916A-0527F43EAEE9}"/>
+              </a:ext>
+            </a:extLst>
+          </p:cNvPr>
+          <p:cNvSpPr>
+            <a:spLocks noGrp="1"/>
+          </p:cNvSpPr>
+          <p:nvPr>
+            <p:ph type="title"/>
+          </p:nvPr>
+        </p:nvSpPr>
+        <p:spPr/>
+        <p:txBody>
+          <a:bodyPr/>
+          <a:lstStyle/>
+          <a:p>
+            <a:r>
+              <a:rPr lang="en-US" dirty="0"/>
+              <a:t>Visual Studio Code Debugger</a:t>
+            </a:r>
+          </a:p>
+        </p:txBody>
+      </p:sp>
       <p:pic>
         <p:nvPicPr>
-          <p:cNvPr id="7" name="Content Placeholder 6">
-            <a:extLst>
-              <a:ext uri="{FF2B5EF4-FFF2-40B4-BE49-F238E27FC236}">
-                <a16:creationId xmlns:a16="http://schemas.microsoft.com/office/drawing/2014/main" id="{63E4929C-9049-47BB-AFD0-DF8BC3A495FC}"/>
+          <p:cNvPr id="5" name="Content Placeholder 4">
+            <a:extLst>
+              <a:ext uri="{FF2B5EF4-FFF2-40B4-BE49-F238E27FC236}">
+                <a16:creationId xmlns:a16="http://schemas.microsoft.com/office/drawing/2014/main" id="{545CE961-007F-4A3E-A3EA-DB15BEA7E7F6}"/>
               </a:ext>
             </a:extLst>
           </p:cNvPr>
@@ -7323,8 +7525,8 @@
         </p:blipFill>
         <p:spPr>
           <a:xfrm>
-            <a:off x="2400252" y="655388"/>
-            <a:ext cx="7391495" cy="5547224"/>
+            <a:off x="2056836" y="2872424"/>
+            <a:ext cx="8078327" cy="2257740"/>
           </a:xfrm>
           <a:prstGeom prst="rect">
             <a:avLst/>
@@ -7334,7 +7536,7 @@
     </p:spTree>
     <p:extLst>
       <p:ext uri="{BB962C8B-B14F-4D97-AF65-F5344CB8AC3E}">
-        <p14:creationId xmlns:p14="http://schemas.microsoft.com/office/powerpoint/2010/main" val="239618671"/>
+        <p14:creationId xmlns:p14="http://schemas.microsoft.com/office/powerpoint/2010/main" val="1583151527"/>
       </p:ext>
     </p:extLst>
   </p:cSld>
@@ -7494,34 +7696,30 @@
       </p:grpSpPr>
       <p:pic>
         <p:nvPicPr>
-          <p:cNvPr id="3" name="Picture 2">
-            <a:extLst>
-              <a:ext uri="{FF2B5EF4-FFF2-40B4-BE49-F238E27FC236}">
-                <a16:creationId xmlns:a16="http://schemas.microsoft.com/office/drawing/2014/main" id="{396E7357-4879-4BD0-B902-6C75F6B5C9C0}"/>
+          <p:cNvPr id="7" name="Content Placeholder 6">
+            <a:extLst>
+              <a:ext uri="{FF2B5EF4-FFF2-40B4-BE49-F238E27FC236}">
+                <a16:creationId xmlns:a16="http://schemas.microsoft.com/office/drawing/2014/main" id="{63E4929C-9049-47BB-AFD0-DF8BC3A495FC}"/>
               </a:ext>
             </a:extLst>
           </p:cNvPr>
           <p:cNvPicPr>
-            <a:picLocks noChangeAspect="1"/>
+            <a:picLocks noGrp="1" noChangeAspect="1"/>
           </p:cNvPicPr>
-          <p:nvPr/>
+          <p:nvPr>
+            <p:ph idx="1"/>
+          </p:nvPr>
         </p:nvPicPr>
         <p:blipFill>
-          <a:blip r:embed="rId2">
-            <a:extLst>
-              <a:ext uri="{28A0092B-C50C-407E-A947-70E740481C1C}">
-                <a14:useLocalDpi xmlns:a14="http://schemas.microsoft.com/office/drawing/2010/main" val="0"/>
-              </a:ext>
-            </a:extLst>
-          </a:blip>
+          <a:blip r:embed="rId2"/>
           <a:stretch>
             <a:fillRect/>
           </a:stretch>
         </p:blipFill>
         <p:spPr>
           <a:xfrm>
-            <a:off x="2971364" y="1823813"/>
-            <a:ext cx="6249272" cy="3210373"/>
+            <a:off x="2400252" y="655388"/>
+            <a:ext cx="7391495" cy="5547224"/>
           </a:xfrm>
           <a:prstGeom prst="rect">
             <a:avLst/>
@@ -7531,7 +7729,7 @@
     </p:spTree>
     <p:extLst>
       <p:ext uri="{BB962C8B-B14F-4D97-AF65-F5344CB8AC3E}">
-        <p14:creationId xmlns:p14="http://schemas.microsoft.com/office/powerpoint/2010/main" val="3634002111"/>
+        <p14:creationId xmlns:p14="http://schemas.microsoft.com/office/powerpoint/2010/main" val="239618671"/>
       </p:ext>
     </p:extLst>
   </p:cSld>
@@ -7586,8 +7784,8 @@
         </p:blipFill>
         <p:spPr>
           <a:xfrm>
-            <a:off x="4135224" y="462879"/>
-            <a:ext cx="3921552" cy="5932241"/>
+            <a:off x="2971364" y="1823813"/>
+            <a:ext cx="6249272" cy="3210373"/>
           </a:xfrm>
           <a:prstGeom prst="rect">
             <a:avLst/>
@@ -7597,7 +7795,7 @@
     </p:spTree>
     <p:extLst>
       <p:ext uri="{BB962C8B-B14F-4D97-AF65-F5344CB8AC3E}">
-        <p14:creationId xmlns:p14="http://schemas.microsoft.com/office/powerpoint/2010/main" val="3209632449"/>
+        <p14:creationId xmlns:p14="http://schemas.microsoft.com/office/powerpoint/2010/main" val="3634002111"/>
       </p:ext>
     </p:extLst>
   </p:cSld>
@@ -7624,63 +7822,46 @@
           <a:chExt cx="0" cy="0"/>
         </a:xfrm>
       </p:grpSpPr>
-      <p:sp>
-        <p:nvSpPr>
-          <p:cNvPr id="2" name="Title 1">
-            <a:extLst>
-              <a:ext uri="{FF2B5EF4-FFF2-40B4-BE49-F238E27FC236}">
-                <a16:creationId xmlns:a16="http://schemas.microsoft.com/office/drawing/2014/main" id="{261C0A93-96AA-44E0-B3D6-FF0275AF9274}"/>
-              </a:ext>
-            </a:extLst>
-          </p:cNvPr>
-          <p:cNvSpPr>
-            <a:spLocks noGrp="1"/>
-          </p:cNvSpPr>
-          <p:nvPr>
-            <p:ph type="ctrTitle"/>
-          </p:nvPr>
-        </p:nvSpPr>
-        <p:spPr/>
-        <p:txBody>
-          <a:bodyPr/>
-          <a:lstStyle/>
-          <a:p>
-            <a:r>
-              <a:rPr lang="en-US" dirty="0"/>
-              <a:t>Unit Tests</a:t>
-            </a:r>
-          </a:p>
-        </p:txBody>
-      </p:sp>
-      <p:sp>
-        <p:nvSpPr>
-          <p:cNvPr id="3" name="Subtitle 2">
-            <a:extLst>
-              <a:ext uri="{FF2B5EF4-FFF2-40B4-BE49-F238E27FC236}">
-                <a16:creationId xmlns:a16="http://schemas.microsoft.com/office/drawing/2014/main" id="{B2892487-6D5E-41D3-98F0-29EC71A8422C}"/>
-              </a:ext>
-            </a:extLst>
-          </p:cNvPr>
-          <p:cNvSpPr>
-            <a:spLocks noGrp="1"/>
-          </p:cNvSpPr>
-          <p:nvPr>
-            <p:ph type="subTitle" idx="1"/>
-          </p:nvPr>
-        </p:nvSpPr>
-        <p:spPr/>
-        <p:txBody>
-          <a:bodyPr/>
-          <a:lstStyle/>
-          <a:p>
-            <a:endParaRPr lang="en-US" dirty="0"/>
-          </a:p>
-        </p:txBody>
-      </p:sp>
+      <p:pic>
+        <p:nvPicPr>
+          <p:cNvPr id="3" name="Picture 2">
+            <a:extLst>
+              <a:ext uri="{FF2B5EF4-FFF2-40B4-BE49-F238E27FC236}">
+                <a16:creationId xmlns:a16="http://schemas.microsoft.com/office/drawing/2014/main" id="{396E7357-4879-4BD0-B902-6C75F6B5C9C0}"/>
+              </a:ext>
+            </a:extLst>
+          </p:cNvPr>
+          <p:cNvPicPr>
+            <a:picLocks noChangeAspect="1"/>
+          </p:cNvPicPr>
+          <p:nvPr/>
+        </p:nvPicPr>
+        <p:blipFill>
+          <a:blip r:embed="rId2">
+            <a:extLst>
+              <a:ext uri="{28A0092B-C50C-407E-A947-70E740481C1C}">
+                <a14:useLocalDpi xmlns:a14="http://schemas.microsoft.com/office/drawing/2010/main" val="0"/>
+              </a:ext>
+            </a:extLst>
+          </a:blip>
+          <a:stretch>
+            <a:fillRect/>
+          </a:stretch>
+        </p:blipFill>
+        <p:spPr>
+          <a:xfrm>
+            <a:off x="4135224" y="462879"/>
+            <a:ext cx="3921552" cy="5932241"/>
+          </a:xfrm>
+          <a:prstGeom prst="rect">
+            <a:avLst/>
+          </a:prstGeom>
+        </p:spPr>
+      </p:pic>
     </p:spTree>
     <p:extLst>
       <p:ext uri="{BB962C8B-B14F-4D97-AF65-F5344CB8AC3E}">
-        <p14:creationId xmlns:p14="http://schemas.microsoft.com/office/powerpoint/2010/main" val="1810469756"/>
+        <p14:creationId xmlns:p14="http://schemas.microsoft.com/office/powerpoint/2010/main" val="3209632449"/>
       </p:ext>
     </p:extLst>
   </p:cSld>
@@ -7707,46 +7888,63 @@
           <a:chExt cx="0" cy="0"/>
         </a:xfrm>
       </p:grpSpPr>
-      <p:pic>
-        <p:nvPicPr>
-          <p:cNvPr id="3" name="Picture 2">
-            <a:extLst>
-              <a:ext uri="{FF2B5EF4-FFF2-40B4-BE49-F238E27FC236}">
-                <a16:creationId xmlns:a16="http://schemas.microsoft.com/office/drawing/2014/main" id="{396E7357-4879-4BD0-B902-6C75F6B5C9C0}"/>
-              </a:ext>
-            </a:extLst>
-          </p:cNvPr>
-          <p:cNvPicPr>
-            <a:picLocks noChangeAspect="1"/>
-          </p:cNvPicPr>
-          <p:nvPr/>
-        </p:nvPicPr>
-        <p:blipFill>
-          <a:blip r:embed="rId2">
-            <a:extLst>
-              <a:ext uri="{28A0092B-C50C-407E-A947-70E740481C1C}">
-                <a14:useLocalDpi xmlns:a14="http://schemas.microsoft.com/office/drawing/2010/main" val="0"/>
-              </a:ext>
-            </a:extLst>
-          </a:blip>
-          <a:stretch>
-            <a:fillRect/>
-          </a:stretch>
-        </p:blipFill>
-        <p:spPr>
-          <a:xfrm>
-            <a:off x="3503689" y="836689"/>
-            <a:ext cx="5184622" cy="5184622"/>
-          </a:xfrm>
-          <a:prstGeom prst="rect">
-            <a:avLst/>
-          </a:prstGeom>
-        </p:spPr>
-      </p:pic>
+      <p:sp>
+        <p:nvSpPr>
+          <p:cNvPr id="2" name="Title 1">
+            <a:extLst>
+              <a:ext uri="{FF2B5EF4-FFF2-40B4-BE49-F238E27FC236}">
+                <a16:creationId xmlns:a16="http://schemas.microsoft.com/office/drawing/2014/main" id="{261C0A93-96AA-44E0-B3D6-FF0275AF9274}"/>
+              </a:ext>
+            </a:extLst>
+          </p:cNvPr>
+          <p:cNvSpPr>
+            <a:spLocks noGrp="1"/>
+          </p:cNvSpPr>
+          <p:nvPr>
+            <p:ph type="ctrTitle"/>
+          </p:nvPr>
+        </p:nvSpPr>
+        <p:spPr/>
+        <p:txBody>
+          <a:bodyPr/>
+          <a:lstStyle/>
+          <a:p>
+            <a:r>
+              <a:rPr lang="en-US" dirty="0"/>
+              <a:t>Unit Tests</a:t>
+            </a:r>
+          </a:p>
+        </p:txBody>
+      </p:sp>
+      <p:sp>
+        <p:nvSpPr>
+          <p:cNvPr id="3" name="Subtitle 2">
+            <a:extLst>
+              <a:ext uri="{FF2B5EF4-FFF2-40B4-BE49-F238E27FC236}">
+                <a16:creationId xmlns:a16="http://schemas.microsoft.com/office/drawing/2014/main" id="{B2892487-6D5E-41D3-98F0-29EC71A8422C}"/>
+              </a:ext>
+            </a:extLst>
+          </p:cNvPr>
+          <p:cNvSpPr>
+            <a:spLocks noGrp="1"/>
+          </p:cNvSpPr>
+          <p:nvPr>
+            <p:ph type="subTitle" idx="1"/>
+          </p:nvPr>
+        </p:nvSpPr>
+        <p:spPr/>
+        <p:txBody>
+          <a:bodyPr/>
+          <a:lstStyle/>
+          <a:p>
+            <a:endParaRPr lang="en-US" dirty="0"/>
+          </a:p>
+        </p:txBody>
+      </p:sp>
     </p:spTree>
     <p:extLst>
       <p:ext uri="{BB962C8B-B14F-4D97-AF65-F5344CB8AC3E}">
-        <p14:creationId xmlns:p14="http://schemas.microsoft.com/office/powerpoint/2010/main" val="2985651573"/>
+        <p14:creationId xmlns:p14="http://schemas.microsoft.com/office/powerpoint/2010/main" val="1810469756"/>
       </p:ext>
     </p:extLst>
   </p:cSld>
@@ -7801,6 +7999,72 @@
         </p:blipFill>
         <p:spPr>
           <a:xfrm>
+            <a:off x="3503689" y="836689"/>
+            <a:ext cx="5184622" cy="5184622"/>
+          </a:xfrm>
+          <a:prstGeom prst="rect">
+            <a:avLst/>
+          </a:prstGeom>
+        </p:spPr>
+      </p:pic>
+    </p:spTree>
+    <p:extLst>
+      <p:ext uri="{BB962C8B-B14F-4D97-AF65-F5344CB8AC3E}">
+        <p14:creationId xmlns:p14="http://schemas.microsoft.com/office/powerpoint/2010/main" val="2985651573"/>
+      </p:ext>
+    </p:extLst>
+  </p:cSld>
+  <p:clrMapOvr>
+    <a:masterClrMapping/>
+  </p:clrMapOvr>
+</p:sld>
+</file>
+
+<file path=ppt/slides/slide25.xml><?xml version="1.0" encoding="utf-8"?>
+<p:sld xmlns:a="http://schemas.openxmlformats.org/drawingml/2006/main" xmlns:r="http://schemas.openxmlformats.org/officeDocument/2006/relationships" xmlns:p="http://schemas.openxmlformats.org/presentationml/2006/main">
+  <p:cSld>
+    <p:spTree>
+      <p:nvGrpSpPr>
+        <p:cNvPr id="1" name=""/>
+        <p:cNvGrpSpPr/>
+        <p:nvPr/>
+      </p:nvGrpSpPr>
+      <p:grpSpPr>
+        <a:xfrm>
+          <a:off x="0" y="0"/>
+          <a:ext cx="0" cy="0"/>
+          <a:chOff x="0" y="0"/>
+          <a:chExt cx="0" cy="0"/>
+        </a:xfrm>
+      </p:grpSpPr>
+      <p:pic>
+        <p:nvPicPr>
+          <p:cNvPr id="3" name="Picture 2">
+            <a:extLst>
+              <a:ext uri="{FF2B5EF4-FFF2-40B4-BE49-F238E27FC236}">
+                <a16:creationId xmlns:a16="http://schemas.microsoft.com/office/drawing/2014/main" id="{396E7357-4879-4BD0-B902-6C75F6B5C9C0}"/>
+              </a:ext>
+            </a:extLst>
+          </p:cNvPr>
+          <p:cNvPicPr>
+            <a:picLocks noChangeAspect="1"/>
+          </p:cNvPicPr>
+          <p:nvPr/>
+        </p:nvPicPr>
+        <p:blipFill>
+          <a:blip r:embed="rId2">
+            <a:extLst>
+              <a:ext uri="{28A0092B-C50C-407E-A947-70E740481C1C}">
+                <a14:useLocalDpi xmlns:a14="http://schemas.microsoft.com/office/drawing/2010/main" val="0"/>
+              </a:ext>
+            </a:extLst>
+          </a:blip>
+          <a:stretch>
+            <a:fillRect/>
+          </a:stretch>
+        </p:blipFill>
+        <p:spPr>
+          <a:xfrm>
             <a:off x="2541912" y="1911309"/>
             <a:ext cx="7108176" cy="3035382"/>
           </a:xfrm>
@@ -7822,7 +8086,7 @@
 </p:sld>
 </file>
 
-<file path=ppt/slides/slide25.xml><?xml version="1.0" encoding="utf-8"?>
+<file path=ppt/slides/slide26.xml><?xml version="1.0" encoding="utf-8"?>
 <p:sld xmlns:a="http://schemas.openxmlformats.org/drawingml/2006/main" xmlns:r="http://schemas.openxmlformats.org/officeDocument/2006/relationships" xmlns:p="http://schemas.openxmlformats.org/presentationml/2006/main">
   <p:cSld>
     <p:spTree>

</xml_diff>